<commit_message>
first initially working scaffolding, demosite renamed to agilesites1 temporarily
</commit_message>
<xml_diff>
--- a/doc/AgileSites.pptx
+++ b/doc/AgileSites.pptx
@@ -5,9 +5,18 @@
     <p:sldMasterId id="2147484258" r:id="rId1"/>
     <p:sldMasterId id="2147484306" r:id="rId2"/>
   </p:sldMasterIdLst>
+  <p:notesMasterIdLst>
+    <p:notesMasterId r:id="rId11"/>
+  </p:notesMasterIdLst>
   <p:sldIdLst>
     <p:sldId id="256" r:id="rId3"/>
     <p:sldId id="257" r:id="rId4"/>
+    <p:sldId id="259" r:id="rId5"/>
+    <p:sldId id="263" r:id="rId6"/>
+    <p:sldId id="260" r:id="rId7"/>
+    <p:sldId id="258" r:id="rId8"/>
+    <p:sldId id="261" r:id="rId9"/>
+    <p:sldId id="262" r:id="rId10"/>
   </p:sldIdLst>
   <p:sldSz cx="9144000" cy="6858000" type="screen4x3"/>
   <p:notesSz cx="6858000" cy="9144000"/>
@@ -109,6 +118,440 @@
 </p:presentation>
 </file>
 
+<file path=ppt/notesMasters/notesMaster1.xml><?xml version="1.0" encoding="utf-8"?>
+<p:notesMaster xmlns:a="http://schemas.openxmlformats.org/drawingml/2006/main" xmlns:r="http://schemas.openxmlformats.org/officeDocument/2006/relationships" xmlns:p="http://schemas.openxmlformats.org/presentationml/2006/main">
+  <p:cSld>
+    <p:bg>
+      <p:bgRef idx="1001">
+        <a:schemeClr val="bg1"/>
+      </p:bgRef>
+    </p:bg>
+    <p:spTree>
+      <p:nvGrpSpPr>
+        <p:cNvPr id="1" name=""/>
+        <p:cNvGrpSpPr/>
+        <p:nvPr/>
+      </p:nvGrpSpPr>
+      <p:grpSpPr>
+        <a:xfrm>
+          <a:off x="0" y="0"/>
+          <a:ext cx="0" cy="0"/>
+          <a:chOff x="0" y="0"/>
+          <a:chExt cx="0" cy="0"/>
+        </a:xfrm>
+      </p:grpSpPr>
+      <p:sp>
+        <p:nvSpPr>
+          <p:cNvPr id="2" name="Header Placeholder 1"/>
+          <p:cNvSpPr>
+            <a:spLocks noGrp="1"/>
+          </p:cNvSpPr>
+          <p:nvPr>
+            <p:ph type="hdr" sz="quarter"/>
+          </p:nvPr>
+        </p:nvSpPr>
+        <p:spPr>
+          <a:xfrm>
+            <a:off x="0" y="0"/>
+            <a:ext cx="2971800" cy="457200"/>
+          </a:xfrm>
+          <a:prstGeom prst="rect">
+            <a:avLst/>
+          </a:prstGeom>
+        </p:spPr>
+        <p:txBody>
+          <a:bodyPr vert="horz" lIns="91440" tIns="45720" rIns="91440" bIns="45720" rtlCol="0"/>
+          <a:lstStyle>
+            <a:lvl1pPr algn="l">
+              <a:defRPr sz="1200"/>
+            </a:lvl1pPr>
+          </a:lstStyle>
+          <a:p>
+            <a:endParaRPr lang="en-US"/>
+          </a:p>
+        </p:txBody>
+      </p:sp>
+      <p:sp>
+        <p:nvSpPr>
+          <p:cNvPr id="3" name="Date Placeholder 2"/>
+          <p:cNvSpPr>
+            <a:spLocks noGrp="1"/>
+          </p:cNvSpPr>
+          <p:nvPr>
+            <p:ph type="dt" idx="1"/>
+          </p:nvPr>
+        </p:nvSpPr>
+        <p:spPr>
+          <a:xfrm>
+            <a:off x="3884613" y="0"/>
+            <a:ext cx="2971800" cy="457200"/>
+          </a:xfrm>
+          <a:prstGeom prst="rect">
+            <a:avLst/>
+          </a:prstGeom>
+        </p:spPr>
+        <p:txBody>
+          <a:bodyPr vert="horz" lIns="91440" tIns="45720" rIns="91440" bIns="45720" rtlCol="0"/>
+          <a:lstStyle>
+            <a:lvl1pPr algn="r">
+              <a:defRPr sz="1200"/>
+            </a:lvl1pPr>
+          </a:lstStyle>
+          <a:p>
+            <a:fld id="{6C7D58DE-E8A8-3846-B1B6-1A170C913015}" type="datetimeFigureOut">
+              <a:rPr lang="en-US" smtClean="0"/>
+              <a:t>13/03/2013</a:t>
+            </a:fld>
+            <a:endParaRPr lang="en-US"/>
+          </a:p>
+        </p:txBody>
+      </p:sp>
+      <p:sp>
+        <p:nvSpPr>
+          <p:cNvPr id="4" name="Slide Image Placeholder 3"/>
+          <p:cNvSpPr>
+            <a:spLocks noGrp="1" noRot="1" noChangeAspect="1"/>
+          </p:cNvSpPr>
+          <p:nvPr>
+            <p:ph type="sldImg" idx="2"/>
+          </p:nvPr>
+        </p:nvSpPr>
+        <p:spPr>
+          <a:xfrm>
+            <a:off x="1143000" y="685800"/>
+            <a:ext cx="4572000" cy="3429000"/>
+          </a:xfrm>
+          <a:prstGeom prst="rect">
+            <a:avLst/>
+          </a:prstGeom>
+          <a:noFill/>
+          <a:ln w="12700">
+            <a:solidFill>
+              <a:prstClr val="black"/>
+            </a:solidFill>
+          </a:ln>
+        </p:spPr>
+        <p:txBody>
+          <a:bodyPr vert="horz" lIns="91440" tIns="45720" rIns="91440" bIns="45720" rtlCol="0" anchor="ctr"/>
+          <a:lstStyle/>
+          <a:p>
+            <a:endParaRPr lang="en-US"/>
+          </a:p>
+        </p:txBody>
+      </p:sp>
+      <p:sp>
+        <p:nvSpPr>
+          <p:cNvPr id="5" name="Notes Placeholder 4"/>
+          <p:cNvSpPr>
+            <a:spLocks noGrp="1"/>
+          </p:cNvSpPr>
+          <p:nvPr>
+            <p:ph type="body" sz="quarter" idx="3"/>
+          </p:nvPr>
+        </p:nvSpPr>
+        <p:spPr>
+          <a:xfrm>
+            <a:off x="685800" y="4343400"/>
+            <a:ext cx="5486400" cy="4114800"/>
+          </a:xfrm>
+          <a:prstGeom prst="rect">
+            <a:avLst/>
+          </a:prstGeom>
+        </p:spPr>
+        <p:txBody>
+          <a:bodyPr vert="horz" lIns="91440" tIns="45720" rIns="91440" bIns="45720" rtlCol="0"/>
+          <a:lstStyle/>
+          <a:p>
+            <a:pPr lvl="0"/>
+            <a:r>
+              <a:rPr lang="it-IT" smtClean="0"/>
+              <a:t>Click to edit Master text styles</a:t>
+            </a:r>
+          </a:p>
+          <a:p>
+            <a:pPr lvl="1"/>
+            <a:r>
+              <a:rPr lang="it-IT" smtClean="0"/>
+              <a:t>Second level</a:t>
+            </a:r>
+          </a:p>
+          <a:p>
+            <a:pPr lvl="2"/>
+            <a:r>
+              <a:rPr lang="it-IT" smtClean="0"/>
+              <a:t>Third level</a:t>
+            </a:r>
+          </a:p>
+          <a:p>
+            <a:pPr lvl="3"/>
+            <a:r>
+              <a:rPr lang="it-IT" smtClean="0"/>
+              <a:t>Fourth level</a:t>
+            </a:r>
+          </a:p>
+          <a:p>
+            <a:pPr lvl="4"/>
+            <a:r>
+              <a:rPr lang="it-IT" smtClean="0"/>
+              <a:t>Fifth level</a:t>
+            </a:r>
+            <a:endParaRPr lang="en-US"/>
+          </a:p>
+        </p:txBody>
+      </p:sp>
+      <p:sp>
+        <p:nvSpPr>
+          <p:cNvPr id="6" name="Footer Placeholder 5"/>
+          <p:cNvSpPr>
+            <a:spLocks noGrp="1"/>
+          </p:cNvSpPr>
+          <p:nvPr>
+            <p:ph type="ftr" sz="quarter" idx="4"/>
+          </p:nvPr>
+        </p:nvSpPr>
+        <p:spPr>
+          <a:xfrm>
+            <a:off x="0" y="8685213"/>
+            <a:ext cx="2971800" cy="457200"/>
+          </a:xfrm>
+          <a:prstGeom prst="rect">
+            <a:avLst/>
+          </a:prstGeom>
+        </p:spPr>
+        <p:txBody>
+          <a:bodyPr vert="horz" lIns="91440" tIns="45720" rIns="91440" bIns="45720" rtlCol="0" anchor="b"/>
+          <a:lstStyle>
+            <a:lvl1pPr algn="l">
+              <a:defRPr sz="1200"/>
+            </a:lvl1pPr>
+          </a:lstStyle>
+          <a:p>
+            <a:endParaRPr lang="en-US"/>
+          </a:p>
+        </p:txBody>
+      </p:sp>
+      <p:sp>
+        <p:nvSpPr>
+          <p:cNvPr id="7" name="Slide Number Placeholder 6"/>
+          <p:cNvSpPr>
+            <a:spLocks noGrp="1"/>
+          </p:cNvSpPr>
+          <p:nvPr>
+            <p:ph type="sldNum" sz="quarter" idx="5"/>
+          </p:nvPr>
+        </p:nvSpPr>
+        <p:spPr>
+          <a:xfrm>
+            <a:off x="3884613" y="8685213"/>
+            <a:ext cx="2971800" cy="457200"/>
+          </a:xfrm>
+          <a:prstGeom prst="rect">
+            <a:avLst/>
+          </a:prstGeom>
+        </p:spPr>
+        <p:txBody>
+          <a:bodyPr vert="horz" lIns="91440" tIns="45720" rIns="91440" bIns="45720" rtlCol="0" anchor="b"/>
+          <a:lstStyle>
+            <a:lvl1pPr algn="r">
+              <a:defRPr sz="1200"/>
+            </a:lvl1pPr>
+          </a:lstStyle>
+          <a:p>
+            <a:fld id="{306081A0-AA35-AB45-AA46-647C1C44EB66}" type="slidenum">
+              <a:rPr lang="en-US" smtClean="0"/>
+              <a:t>‹#›</a:t>
+            </a:fld>
+            <a:endParaRPr lang="en-US"/>
+          </a:p>
+        </p:txBody>
+      </p:sp>
+    </p:spTree>
+    <p:extLst>
+      <p:ext uri="{BB962C8B-B14F-4D97-AF65-F5344CB8AC3E}">
+        <p14:creationId xmlns:p14="http://schemas.microsoft.com/office/powerpoint/2010/main" val="446246929"/>
+      </p:ext>
+    </p:extLst>
+  </p:cSld>
+  <p:clrMap bg1="lt1" tx1="dk1" bg2="lt2" tx2="dk2" accent1="accent1" accent2="accent2" accent3="accent3" accent4="accent4" accent5="accent5" accent6="accent6" hlink="hlink" folHlink="folHlink"/>
+  <p:notesStyle>
+    <a:lvl1pPr marL="0" algn="l" defTabSz="457200" rtl="0" eaLnBrk="1" latinLnBrk="0" hangingPunct="1">
+      <a:defRPr sz="1200" kern="1200">
+        <a:solidFill>
+          <a:schemeClr val="tx1"/>
+        </a:solidFill>
+        <a:latin typeface="+mn-lt"/>
+        <a:ea typeface="+mn-ea"/>
+        <a:cs typeface="+mn-cs"/>
+      </a:defRPr>
+    </a:lvl1pPr>
+    <a:lvl2pPr marL="457200" algn="l" defTabSz="457200" rtl="0" eaLnBrk="1" latinLnBrk="0" hangingPunct="1">
+      <a:defRPr sz="1200" kern="1200">
+        <a:solidFill>
+          <a:schemeClr val="tx1"/>
+        </a:solidFill>
+        <a:latin typeface="+mn-lt"/>
+        <a:ea typeface="+mn-ea"/>
+        <a:cs typeface="+mn-cs"/>
+      </a:defRPr>
+    </a:lvl2pPr>
+    <a:lvl3pPr marL="914400" algn="l" defTabSz="457200" rtl="0" eaLnBrk="1" latinLnBrk="0" hangingPunct="1">
+      <a:defRPr sz="1200" kern="1200">
+        <a:solidFill>
+          <a:schemeClr val="tx1"/>
+        </a:solidFill>
+        <a:latin typeface="+mn-lt"/>
+        <a:ea typeface="+mn-ea"/>
+        <a:cs typeface="+mn-cs"/>
+      </a:defRPr>
+    </a:lvl3pPr>
+    <a:lvl4pPr marL="1371600" algn="l" defTabSz="457200" rtl="0" eaLnBrk="1" latinLnBrk="0" hangingPunct="1">
+      <a:defRPr sz="1200" kern="1200">
+        <a:solidFill>
+          <a:schemeClr val="tx1"/>
+        </a:solidFill>
+        <a:latin typeface="+mn-lt"/>
+        <a:ea typeface="+mn-ea"/>
+        <a:cs typeface="+mn-cs"/>
+      </a:defRPr>
+    </a:lvl4pPr>
+    <a:lvl5pPr marL="1828800" algn="l" defTabSz="457200" rtl="0" eaLnBrk="1" latinLnBrk="0" hangingPunct="1">
+      <a:defRPr sz="1200" kern="1200">
+        <a:solidFill>
+          <a:schemeClr val="tx1"/>
+        </a:solidFill>
+        <a:latin typeface="+mn-lt"/>
+        <a:ea typeface="+mn-ea"/>
+        <a:cs typeface="+mn-cs"/>
+      </a:defRPr>
+    </a:lvl5pPr>
+    <a:lvl6pPr marL="2286000" algn="l" defTabSz="457200" rtl="0" eaLnBrk="1" latinLnBrk="0" hangingPunct="1">
+      <a:defRPr sz="1200" kern="1200">
+        <a:solidFill>
+          <a:schemeClr val="tx1"/>
+        </a:solidFill>
+        <a:latin typeface="+mn-lt"/>
+        <a:ea typeface="+mn-ea"/>
+        <a:cs typeface="+mn-cs"/>
+      </a:defRPr>
+    </a:lvl6pPr>
+    <a:lvl7pPr marL="2743200" algn="l" defTabSz="457200" rtl="0" eaLnBrk="1" latinLnBrk="0" hangingPunct="1">
+      <a:defRPr sz="1200" kern="1200">
+        <a:solidFill>
+          <a:schemeClr val="tx1"/>
+        </a:solidFill>
+        <a:latin typeface="+mn-lt"/>
+        <a:ea typeface="+mn-ea"/>
+        <a:cs typeface="+mn-cs"/>
+      </a:defRPr>
+    </a:lvl7pPr>
+    <a:lvl8pPr marL="3200400" algn="l" defTabSz="457200" rtl="0" eaLnBrk="1" latinLnBrk="0" hangingPunct="1">
+      <a:defRPr sz="1200" kern="1200">
+        <a:solidFill>
+          <a:schemeClr val="tx1"/>
+        </a:solidFill>
+        <a:latin typeface="+mn-lt"/>
+        <a:ea typeface="+mn-ea"/>
+        <a:cs typeface="+mn-cs"/>
+      </a:defRPr>
+    </a:lvl8pPr>
+    <a:lvl9pPr marL="3657600" algn="l" defTabSz="457200" rtl="0" eaLnBrk="1" latinLnBrk="0" hangingPunct="1">
+      <a:defRPr sz="1200" kern="1200">
+        <a:solidFill>
+          <a:schemeClr val="tx1"/>
+        </a:solidFill>
+        <a:latin typeface="+mn-lt"/>
+        <a:ea typeface="+mn-ea"/>
+        <a:cs typeface="+mn-cs"/>
+      </a:defRPr>
+    </a:lvl9pPr>
+  </p:notesStyle>
+</p:notesMaster>
+</file>
+
+<file path=ppt/notesSlides/notesSlide1.xml><?xml version="1.0" encoding="utf-8"?>
+<p:notes xmlns:a="http://schemas.openxmlformats.org/drawingml/2006/main" xmlns:r="http://schemas.openxmlformats.org/officeDocument/2006/relationships" xmlns:p="http://schemas.openxmlformats.org/presentationml/2006/main">
+  <p:cSld>
+    <p:spTree>
+      <p:nvGrpSpPr>
+        <p:cNvPr id="1" name=""/>
+        <p:cNvGrpSpPr/>
+        <p:nvPr/>
+      </p:nvGrpSpPr>
+      <p:grpSpPr>
+        <a:xfrm>
+          <a:off x="0" y="0"/>
+          <a:ext cx="0" cy="0"/>
+          <a:chOff x="0" y="0"/>
+          <a:chExt cx="0" cy="0"/>
+        </a:xfrm>
+      </p:grpSpPr>
+      <p:sp>
+        <p:nvSpPr>
+          <p:cNvPr id="2" name="Slide Image Placeholder 1"/>
+          <p:cNvSpPr>
+            <a:spLocks noGrp="1" noRot="1" noChangeAspect="1"/>
+          </p:cNvSpPr>
+          <p:nvPr>
+            <p:ph type="sldImg"/>
+          </p:nvPr>
+        </p:nvSpPr>
+        <p:spPr/>
+      </p:sp>
+      <p:sp>
+        <p:nvSpPr>
+          <p:cNvPr id="3" name="Notes Placeholder 2"/>
+          <p:cNvSpPr>
+            <a:spLocks noGrp="1"/>
+          </p:cNvSpPr>
+          <p:nvPr>
+            <p:ph type="body" idx="1"/>
+          </p:nvPr>
+        </p:nvSpPr>
+        <p:spPr/>
+        <p:txBody>
+          <a:bodyPr/>
+          <a:lstStyle/>
+          <a:p>
+            <a:endParaRPr lang="en-US" dirty="0"/>
+          </a:p>
+        </p:txBody>
+      </p:sp>
+      <p:sp>
+        <p:nvSpPr>
+          <p:cNvPr id="4" name="Slide Number Placeholder 3"/>
+          <p:cNvSpPr>
+            <a:spLocks noGrp="1"/>
+          </p:cNvSpPr>
+          <p:nvPr>
+            <p:ph type="sldNum" sz="quarter" idx="10"/>
+          </p:nvPr>
+        </p:nvSpPr>
+        <p:spPr/>
+        <p:txBody>
+          <a:bodyPr/>
+          <a:lstStyle/>
+          <a:p>
+            <a:fld id="{306081A0-AA35-AB45-AA46-647C1C44EB66}" type="slidenum">
+              <a:rPr lang="en-US" smtClean="0"/>
+              <a:t>1</a:t>
+            </a:fld>
+            <a:endParaRPr lang="en-US"/>
+          </a:p>
+        </p:txBody>
+      </p:sp>
+    </p:spTree>
+    <p:extLst>
+      <p:ext uri="{BB962C8B-B14F-4D97-AF65-F5344CB8AC3E}">
+        <p14:creationId xmlns:p14="http://schemas.microsoft.com/office/powerpoint/2010/main" val="3479919204"/>
+      </p:ext>
+    </p:extLst>
+  </p:cSld>
+  <p:clrMapOvr>
+    <a:masterClrMapping/>
+  </p:clrMapOvr>
+</p:notes>
+</file>
+
 <file path=ppt/slideLayouts/slideLayout1.xml><?xml version="1.0" encoding="utf-8"?>
 <p:sldLayout xmlns:a="http://schemas.openxmlformats.org/drawingml/2006/main" xmlns:r="http://schemas.openxmlformats.org/officeDocument/2006/relationships" xmlns:p="http://schemas.openxmlformats.org/presentationml/2006/main" type="title" preserve="1">
   <p:cSld name="Title Slide">
@@ -290,7 +733,7 @@
           <a:p>
             <a:fld id="{346AF92F-088B-A449-A317-15B48F684384}" type="datetimeFigureOut">
               <a:rPr lang="en-US" smtClean="0"/>
-              <a:t>10/03/2013</a:t>
+              <a:t>13/03/2013</a:t>
             </a:fld>
             <a:endParaRPr lang="en-US"/>
           </a:p>
@@ -460,7 +903,7 @@
           <a:p>
             <a:fld id="{346AF92F-088B-A449-A317-15B48F684384}" type="datetimeFigureOut">
               <a:rPr lang="en-US" smtClean="0"/>
-              <a:t>10/03/2013</a:t>
+              <a:t>13/03/2013</a:t>
             </a:fld>
             <a:endParaRPr lang="en-US"/>
           </a:p>
@@ -640,7 +1083,7 @@
           <a:p>
             <a:fld id="{346AF92F-088B-A449-A317-15B48F684384}" type="datetimeFigureOut">
               <a:rPr lang="en-US" smtClean="0"/>
-              <a:t>10/03/2013</a:t>
+              <a:t>13/03/2013</a:t>
             </a:fld>
             <a:endParaRPr lang="en-US"/>
           </a:p>
@@ -745,8 +1188,24 @@
           </a:lstStyle>
           <a:p>
             <a:r>
-              <a:rPr lang="it-IT" smtClean="0"/>
-              <a:t>Click to edit Master title style</a:t>
+              <a:rPr lang="it-IT" dirty="0" smtClean="0"/>
+              <a:t>Click to </a:t>
+            </a:r>
+            <a:r>
+              <a:rPr lang="it-IT" dirty="0" err="1" smtClean="0"/>
+              <a:t>edit</a:t>
+            </a:r>
+            <a:r>
+              <a:rPr lang="it-IT" dirty="0" smtClean="0"/>
+              <a:t> Master </a:t>
+            </a:r>
+            <a:r>
+              <a:rPr lang="it-IT" dirty="0" err="1" smtClean="0"/>
+              <a:t>title</a:t>
+            </a:r>
+            <a:r>
+              <a:rPr lang="it-IT" dirty="0" smtClean="0"/>
+              <a:t> style</a:t>
             </a:r>
             <a:endParaRPr lang="en-US" dirty="0"/>
           </a:p>
@@ -865,8 +1324,24 @@
           </a:lstStyle>
           <a:p>
             <a:r>
-              <a:rPr lang="it-IT" smtClean="0"/>
-              <a:t>Click to edit Master subtitle style</a:t>
+              <a:rPr lang="it-IT" dirty="0" smtClean="0"/>
+              <a:t>Click to </a:t>
+            </a:r>
+            <a:r>
+              <a:rPr lang="it-IT" dirty="0" err="1" smtClean="0"/>
+              <a:t>edit</a:t>
+            </a:r>
+            <a:r>
+              <a:rPr lang="it-IT" dirty="0" smtClean="0"/>
+              <a:t> Master </a:t>
+            </a:r>
+            <a:r>
+              <a:rPr lang="it-IT" dirty="0" err="1" smtClean="0"/>
+              <a:t>subtitle</a:t>
+            </a:r>
+            <a:r>
+              <a:rPr lang="it-IT" dirty="0" smtClean="0"/>
+              <a:t> style</a:t>
             </a:r>
             <a:endParaRPr lang="en-US" dirty="0"/>
           </a:p>
@@ -889,7 +1364,7 @@
           <a:p>
             <a:fld id="{346AF92F-088B-A449-A317-15B48F684384}" type="datetimeFigureOut">
               <a:rPr lang="en-US" smtClean="0"/>
-              <a:t>10/03/2013</a:t>
+              <a:t>13/03/2013</a:t>
             </a:fld>
             <a:endParaRPr lang="en-US"/>
           </a:p>
@@ -1037,38 +1512,78 @@
           <a:p>
             <a:pPr lvl="0"/>
             <a:r>
-              <a:rPr lang="it-IT" smtClean="0"/>
-              <a:t>Click to edit Master text styles</a:t>
-            </a:r>
+              <a:rPr lang="it-IT" dirty="0" smtClean="0"/>
+              <a:t>Click to </a:t>
+            </a:r>
+            <a:r>
+              <a:rPr lang="it-IT" dirty="0" err="1" smtClean="0"/>
+              <a:t>edit</a:t>
+            </a:r>
+            <a:r>
+              <a:rPr lang="it-IT" dirty="0" smtClean="0"/>
+              <a:t> Master text </a:t>
+            </a:r>
+            <a:r>
+              <a:rPr lang="it-IT" dirty="0" err="1" smtClean="0"/>
+              <a:t>styles</a:t>
+            </a:r>
+            <a:endParaRPr lang="it-IT" dirty="0" smtClean="0"/>
           </a:p>
           <a:p>
             <a:pPr lvl="1"/>
             <a:r>
-              <a:rPr lang="it-IT" smtClean="0"/>
-              <a:t>Second level</a:t>
-            </a:r>
+              <a:rPr lang="it-IT" dirty="0" smtClean="0"/>
+              <a:t>Second </a:t>
+            </a:r>
+            <a:r>
+              <a:rPr lang="it-IT" dirty="0" err="1" smtClean="0"/>
+              <a:t>level</a:t>
+            </a:r>
+            <a:endParaRPr lang="it-IT" dirty="0" smtClean="0"/>
           </a:p>
           <a:p>
             <a:pPr lvl="2"/>
             <a:r>
-              <a:rPr lang="it-IT" smtClean="0"/>
-              <a:t>Third level</a:t>
-            </a:r>
+              <a:rPr lang="it-IT" dirty="0" smtClean="0"/>
+              <a:t>Third </a:t>
+            </a:r>
+            <a:r>
+              <a:rPr lang="it-IT" dirty="0" err="1" smtClean="0"/>
+              <a:t>level</a:t>
+            </a:r>
+            <a:endParaRPr lang="it-IT" dirty="0" smtClean="0"/>
           </a:p>
           <a:p>
             <a:pPr lvl="3"/>
             <a:r>
-              <a:rPr lang="it-IT" smtClean="0"/>
-              <a:t>Fourth level</a:t>
-            </a:r>
+              <a:rPr lang="it-IT" dirty="0" err="1" smtClean="0"/>
+              <a:t>Fourth</a:t>
+            </a:r>
+            <a:r>
+              <a:rPr lang="it-IT" dirty="0" smtClean="0"/>
+              <a:t> </a:t>
+            </a:r>
+            <a:r>
+              <a:rPr lang="it-IT" dirty="0" err="1" smtClean="0"/>
+              <a:t>level</a:t>
+            </a:r>
+            <a:endParaRPr lang="it-IT" dirty="0" smtClean="0"/>
           </a:p>
           <a:p>
             <a:pPr lvl="4"/>
             <a:r>
-              <a:rPr lang="it-IT" smtClean="0"/>
-              <a:t>Fifth level</a:t>
-            </a:r>
-            <a:endParaRPr lang="en-US"/>
+              <a:rPr lang="it-IT" dirty="0" err="1" smtClean="0"/>
+              <a:t>Fifth</a:t>
+            </a:r>
+            <a:r>
+              <a:rPr lang="it-IT" dirty="0" smtClean="0"/>
+              <a:t> </a:t>
+            </a:r>
+            <a:r>
+              <a:rPr lang="it-IT" dirty="0" err="1" smtClean="0"/>
+              <a:t>level</a:t>
+            </a:r>
+            <a:endParaRPr lang="en-US" dirty="0"/>
           </a:p>
         </p:txBody>
       </p:sp>
@@ -1089,7 +1604,7 @@
           <a:p>
             <a:fld id="{346AF92F-088B-A449-A317-15B48F684384}" type="datetimeFigureOut">
               <a:rPr lang="en-US" smtClean="0"/>
-              <a:t>10/03/2013</a:t>
+              <a:t>13/03/2013</a:t>
             </a:fld>
             <a:endParaRPr lang="en-US"/>
           </a:p>
@@ -1337,7 +1852,7 @@
           <a:p>
             <a:fld id="{346AF92F-088B-A449-A317-15B48F684384}" type="datetimeFigureOut">
               <a:rPr lang="en-US" smtClean="0"/>
-              <a:t>10/03/2013</a:t>
+              <a:t>13/03/2013</a:t>
             </a:fld>
             <a:endParaRPr lang="en-US"/>
           </a:p>
@@ -1655,7 +2170,7 @@
           <a:p>
             <a:fld id="{346AF92F-088B-A449-A317-15B48F684384}" type="datetimeFigureOut">
               <a:rPr lang="en-US" smtClean="0"/>
-              <a:t>10/03/2013</a:t>
+              <a:t>13/03/2013</a:t>
             </a:fld>
             <a:endParaRPr lang="en-US"/>
           </a:p>
@@ -2121,7 +2636,7 @@
           <a:p>
             <a:fld id="{346AF92F-088B-A449-A317-15B48F684384}" type="datetimeFigureOut">
               <a:rPr lang="en-US" smtClean="0"/>
-              <a:t>10/03/2013</a:t>
+              <a:t>13/03/2013</a:t>
             </a:fld>
             <a:endParaRPr lang="en-US"/>
           </a:p>
@@ -2269,7 +2784,7 @@
           <a:p>
             <a:fld id="{346AF92F-088B-A449-A317-15B48F684384}" type="datetimeFigureOut">
               <a:rPr lang="en-US" smtClean="0"/>
-              <a:t>10/03/2013</a:t>
+              <a:t>13/03/2013</a:t>
             </a:fld>
             <a:endParaRPr lang="en-US"/>
           </a:p>
@@ -2359,7 +2874,7 @@
           <a:p>
             <a:fld id="{346AF92F-088B-A449-A317-15B48F684384}" type="datetimeFigureOut">
               <a:rPr lang="en-US" smtClean="0"/>
-              <a:t>10/03/2013</a:t>
+              <a:t>13/03/2013</a:t>
             </a:fld>
             <a:endParaRPr lang="en-US"/>
           </a:p>
@@ -2633,7 +3148,7 @@
           <a:p>
             <a:fld id="{346AF92F-088B-A449-A317-15B48F684384}" type="datetimeFigureOut">
               <a:rPr lang="en-US" smtClean="0"/>
-              <a:t>10/03/2013</a:t>
+              <a:t>13/03/2013</a:t>
             </a:fld>
             <a:endParaRPr lang="en-US"/>
           </a:p>
@@ -2833,7 +3348,7 @@
           <a:p>
             <a:fld id="{346AF92F-088B-A449-A317-15B48F684384}" type="datetimeFigureOut">
               <a:rPr lang="en-US" smtClean="0"/>
-              <a:t>10/03/2013</a:t>
+              <a:t>13/03/2013</a:t>
             </a:fld>
             <a:endParaRPr lang="en-US"/>
           </a:p>
@@ -3108,7 +3623,7 @@
           <a:p>
             <a:fld id="{346AF92F-088B-A449-A317-15B48F684384}" type="datetimeFigureOut">
               <a:rPr lang="en-US" smtClean="0"/>
-              <a:t>10/03/2013</a:t>
+              <a:t>13/03/2013</a:t>
             </a:fld>
             <a:endParaRPr lang="en-US"/>
           </a:p>
@@ -3273,7 +3788,7 @@
           <a:p>
             <a:fld id="{346AF92F-088B-A449-A317-15B48F684384}" type="datetimeFigureOut">
               <a:rPr lang="en-US" smtClean="0"/>
-              <a:t>10/03/2013</a:t>
+              <a:t>13/03/2013</a:t>
             </a:fld>
             <a:endParaRPr lang="en-US"/>
           </a:p>
@@ -3448,7 +3963,7 @@
           <a:p>
             <a:fld id="{346AF92F-088B-A449-A317-15B48F684384}" type="datetimeFigureOut">
               <a:rPr lang="en-US" smtClean="0"/>
-              <a:t>10/03/2013</a:t>
+              <a:t>13/03/2013</a:t>
             </a:fld>
             <a:endParaRPr lang="en-US"/>
           </a:p>
@@ -3689,7 +4204,7 @@
           <a:p>
             <a:fld id="{346AF92F-088B-A449-A317-15B48F684384}" type="datetimeFigureOut">
               <a:rPr lang="en-US" smtClean="0"/>
-              <a:t>10/03/2013</a:t>
+              <a:t>13/03/2013</a:t>
             </a:fld>
             <a:endParaRPr lang="en-US"/>
           </a:p>
@@ -3977,7 +4492,7 @@
           <a:p>
             <a:fld id="{346AF92F-088B-A449-A317-15B48F684384}" type="datetimeFigureOut">
               <a:rPr lang="en-US" smtClean="0"/>
-              <a:t>10/03/2013</a:t>
+              <a:t>13/03/2013</a:t>
             </a:fld>
             <a:endParaRPr lang="en-US"/>
           </a:p>
@@ -4399,7 +4914,7 @@
           <a:p>
             <a:fld id="{346AF92F-088B-A449-A317-15B48F684384}" type="datetimeFigureOut">
               <a:rPr lang="en-US" smtClean="0"/>
-              <a:t>10/03/2013</a:t>
+              <a:t>13/03/2013</a:t>
             </a:fld>
             <a:endParaRPr lang="en-US"/>
           </a:p>
@@ -4517,7 +5032,7 @@
           <a:p>
             <a:fld id="{346AF92F-088B-A449-A317-15B48F684384}" type="datetimeFigureOut">
               <a:rPr lang="en-US" smtClean="0"/>
-              <a:t>10/03/2013</a:t>
+              <a:t>13/03/2013</a:t>
             </a:fld>
             <a:endParaRPr lang="en-US"/>
           </a:p>
@@ -4612,7 +5127,7 @@
           <a:p>
             <a:fld id="{346AF92F-088B-A449-A317-15B48F684384}" type="datetimeFigureOut">
               <a:rPr lang="en-US" smtClean="0"/>
-              <a:t>10/03/2013</a:t>
+              <a:t>13/03/2013</a:t>
             </a:fld>
             <a:endParaRPr lang="en-US"/>
           </a:p>
@@ -4889,7 +5404,7 @@
           <a:p>
             <a:fld id="{346AF92F-088B-A449-A317-15B48F684384}" type="datetimeFigureOut">
               <a:rPr lang="en-US" smtClean="0"/>
-              <a:t>10/03/2013</a:t>
+              <a:t>13/03/2013</a:t>
             </a:fld>
             <a:endParaRPr lang="en-US"/>
           </a:p>
@@ -5142,7 +5657,7 @@
           <a:p>
             <a:fld id="{346AF92F-088B-A449-A317-15B48F684384}" type="datetimeFigureOut">
               <a:rPr lang="en-US" smtClean="0"/>
-              <a:t>10/03/2013</a:t>
+              <a:t>13/03/2013</a:t>
             </a:fld>
             <a:endParaRPr lang="en-US"/>
           </a:p>
@@ -5355,7 +5870,7 @@
           <a:p>
             <a:fld id="{346AF92F-088B-A449-A317-15B48F684384}" type="datetimeFigureOut">
               <a:rPr lang="en-US" smtClean="0"/>
-              <a:t>10/03/2013</a:t>
+              <a:t>13/03/2013</a:t>
             </a:fld>
             <a:endParaRPr lang="en-US"/>
           </a:p>
@@ -5802,7 +6317,7 @@
         </p:spPr>
         <p:txBody>
           <a:bodyPr vert="horz" lIns="91440" tIns="45720" rIns="91440" bIns="45720" rtlCol="0" anchor="ctr">
-            <a:normAutofit/>
+            <a:noAutofit/>
           </a:bodyPr>
           <a:lstStyle/>
           <a:p>
@@ -6011,7 +6526,7 @@
           <a:p>
             <a:fld id="{346AF92F-088B-A449-A317-15B48F684384}" type="datetimeFigureOut">
               <a:rPr lang="en-US" smtClean="0"/>
-              <a:t>10/03/2013</a:t>
+              <a:t>13/03/2013</a:t>
             </a:fld>
             <a:endParaRPr lang="en-US"/>
           </a:p>
@@ -6114,13 +6629,13 @@
           <a:spcPct val="0"/>
         </a:spcBef>
         <a:buNone/>
-        <a:defRPr sz="4400" kern="1200" spc="-100" baseline="0">
+        <a:defRPr sz="5400" b="1" i="0" kern="1200" spc="-100" baseline="0">
           <a:solidFill>
             <a:schemeClr val="tx2"/>
           </a:solidFill>
-          <a:latin typeface="Abadi MT Condensed Extra Bold"/>
+          <a:latin typeface="Chalkboard"/>
           <a:ea typeface="+mj-ea"/>
-          <a:cs typeface="Abadi MT Condensed Extra Bold"/>
+          <a:cs typeface="Chalkboard"/>
         </a:defRPr>
       </a:lvl1pPr>
     </p:titleStyle>
@@ -6423,11 +6938,23 @@
           <a:bodyPr/>
           <a:lstStyle/>
           <a:p>
-            <a:r>
-              <a:rPr lang="en-US" dirty="0" smtClean="0"/>
-              <a:t>AGILESITES 0.5</a:t>
-            </a:r>
-            <a:endParaRPr lang="en-US" dirty="0"/>
+            <a:pPr algn="ctr"/>
+            <a:r>
+              <a:rPr lang="en-US" cap="none" dirty="0" smtClean="0"/>
+              <a:t>INTRODUCING</a:t>
+            </a:r>
+            <a:br>
+              <a:rPr lang="en-US" cap="none" dirty="0" smtClean="0"/>
+            </a:br>
+            <a:r>
+              <a:rPr lang="en-US" cap="none" dirty="0" err="1" smtClean="0"/>
+              <a:t>AgileSites</a:t>
+            </a:r>
+            <a:r>
+              <a:rPr lang="en-US" cap="none" dirty="0" smtClean="0"/>
+              <a:t> 0.5</a:t>
+            </a:r>
+            <a:endParaRPr lang="en-US" cap="none" dirty="0"/>
           </a:p>
         </p:txBody>
       </p:sp>
@@ -6441,33 +6968,56 @@
             <p:ph type="subTitle" idx="1"/>
           </p:nvPr>
         </p:nvSpPr>
-        <p:spPr/>
+        <p:spPr>
+          <a:xfrm>
+            <a:off x="685800" y="3500826"/>
+            <a:ext cx="7799750" cy="2090497"/>
+          </a:xfrm>
+        </p:spPr>
         <p:txBody>
           <a:bodyPr>
-            <a:normAutofit/>
+            <a:noAutofit/>
           </a:bodyPr>
           <a:lstStyle/>
           <a:p>
             <a:r>
-              <a:rPr lang="en-US" sz="2400" dirty="0" smtClean="0"/>
-              <a:t>Agile and Easy Development</a:t>
-            </a:r>
-            <a:br>
-              <a:rPr lang="en-US" sz="2400" dirty="0" smtClean="0"/>
-            </a:br>
-            <a:r>
-              <a:rPr lang="en-US" sz="2400" dirty="0" smtClean="0"/>
-              <a:t>for Oracle </a:t>
-            </a:r>
-            <a:r>
-              <a:rPr lang="en-US" sz="2400" dirty="0" err="1" smtClean="0"/>
+              <a:rPr lang="en-US" sz="4000" b="1" dirty="0" smtClean="0"/>
+              <a:t>Agile</a:t>
+            </a:r>
+            <a:r>
+              <a:rPr lang="en-US" sz="4000" dirty="0" smtClean="0"/>
+              <a:t> and </a:t>
+            </a:r>
+            <a:r>
+              <a:rPr lang="en-US" sz="4000" b="1" dirty="0" smtClean="0"/>
+              <a:t>Easy</a:t>
+            </a:r>
+            <a:r>
+              <a:rPr lang="en-US" sz="4000" dirty="0" smtClean="0"/>
+              <a:t> Development</a:t>
+            </a:r>
+            <a:endParaRPr lang="en-US" sz="4000" dirty="0"/>
+          </a:p>
+          <a:p>
+            <a:r>
+              <a:rPr lang="en-US" sz="4000" dirty="0" smtClean="0"/>
+              <a:t>for </a:t>
+            </a:r>
+            <a:r>
+              <a:rPr lang="en-US" sz="4000" i="1" dirty="0" smtClean="0"/>
+              <a:t>Oracle </a:t>
+            </a:r>
+          </a:p>
+          <a:p>
+            <a:r>
+              <a:rPr lang="en-US" sz="4000" i="1" dirty="0" err="1" smtClean="0"/>
               <a:t>WebCenter</a:t>
             </a:r>
             <a:r>
-              <a:rPr lang="en-US" sz="2400" dirty="0" smtClean="0"/>
+              <a:rPr lang="en-US" sz="4000" i="1" dirty="0" smtClean="0"/>
               <a:t> Sites</a:t>
             </a:r>
-            <a:endParaRPr lang="en-US" sz="2400" dirty="0"/>
+            <a:endParaRPr lang="en-US" sz="4000" i="1" dirty="0"/>
           </a:p>
         </p:txBody>
       </p:sp>
@@ -6480,7 +7030,7 @@
           <p:nvPr/>
         </p:nvPicPr>
         <p:blipFill>
-          <a:blip r:embed="rId2">
+          <a:blip r:embed="rId3">
             <a:extLst>
               <a:ext uri="{28A0092B-C50C-407E-A947-70E740481C1C}">
                 <a14:useLocalDpi xmlns:a14="http://schemas.microsoft.com/office/drawing/2010/main" val="0"/>
@@ -6510,7 +7060,7 @@
           <p:nvPr/>
         </p:nvPicPr>
         <p:blipFill>
-          <a:blip r:embed="rId3">
+          <a:blip r:embed="rId4">
             <a:extLst>
               <a:ext uri="{28A0092B-C50C-407E-A947-70E740481C1C}">
                 <a14:useLocalDpi xmlns:a14="http://schemas.microsoft.com/office/drawing/2010/main" val="0"/>
@@ -6523,8 +7073,8 @@
         </p:blipFill>
         <p:spPr>
           <a:xfrm>
-            <a:off x="3968716" y="516964"/>
-            <a:ext cx="1658999" cy="1709272"/>
+            <a:off x="4046791" y="337490"/>
+            <a:ext cx="1320598" cy="1360616"/>
           </a:xfrm>
           <a:prstGeom prst="rect">
             <a:avLst/>
@@ -6573,22 +7123,36 @@
         </p:nvSpPr>
         <p:spPr/>
         <p:txBody>
-          <a:bodyPr/>
-          <a:lstStyle/>
-          <a:p>
-            <a:r>
-              <a:rPr lang="en-US" dirty="0" smtClean="0"/>
+          <a:bodyPr>
+            <a:normAutofit/>
+          </a:bodyPr>
+          <a:lstStyle/>
+          <a:p>
+            <a:r>
+              <a:rPr lang="en-US" sz="5400" b="1" dirty="0" smtClean="0">
+                <a:latin typeface="Chalkboard"/>
+                <a:cs typeface="Chalkboard"/>
+              </a:rPr>
               <a:t>What is </a:t>
             </a:r>
             <a:r>
-              <a:rPr lang="en-US" dirty="0" err="1" smtClean="0"/>
+              <a:rPr lang="en-US" sz="5400" b="1" dirty="0" err="1" smtClean="0">
+                <a:latin typeface="Chalkboard"/>
+                <a:cs typeface="Chalkboard"/>
+              </a:rPr>
               <a:t>AgileSites</a:t>
             </a:r>
             <a:r>
-              <a:rPr lang="en-US" dirty="0" smtClean="0"/>
+              <a:rPr lang="en-US" sz="5400" b="1" dirty="0" smtClean="0">
+                <a:latin typeface="Chalkboard"/>
+                <a:cs typeface="Chalkboard"/>
+              </a:rPr>
               <a:t>?</a:t>
             </a:r>
-            <a:endParaRPr lang="en-US" dirty="0"/>
+            <a:endParaRPr lang="en-US" sz="5400" b="1" dirty="0">
+              <a:latin typeface="Chalkboard"/>
+              <a:cs typeface="Chalkboard"/>
+            </a:endParaRPr>
           </a:p>
         </p:txBody>
       </p:sp>
@@ -6619,19 +7183,11 @@
             </a:r>
             <a:r>
               <a:rPr lang="en-US" dirty="0" smtClean="0"/>
-              <a:t> Site </a:t>
-            </a:r>
-            <a:r>
-              <a:rPr lang="en-US" dirty="0" smtClean="0"/>
-              <a:t>is </a:t>
+              <a:t> Site is </a:t>
             </a:r>
             <a:r>
               <a:rPr lang="en-US" b="1" dirty="0" smtClean="0"/>
-              <a:t>much </a:t>
-            </a:r>
-            <a:r>
-              <a:rPr lang="en-US" b="1" dirty="0" smtClean="0"/>
-              <a:t>harder</a:t>
+              <a:t>much harder</a:t>
             </a:r>
             <a:r>
               <a:rPr lang="en-US" dirty="0" smtClean="0"/>
@@ -6642,43 +7198,62 @@
             <a:pPr lvl="1"/>
             <a:r>
               <a:rPr lang="en-US" dirty="0" smtClean="0"/>
-              <a:t>No developer isolation</a:t>
+              <a:t>Mixing HTML and Code</a:t>
             </a:r>
           </a:p>
           <a:p>
             <a:pPr lvl="1"/>
             <a:r>
               <a:rPr lang="en-US" dirty="0" smtClean="0"/>
-              <a:t>Ugly and verbose API</a:t>
+              <a:t>Ugly </a:t>
+            </a:r>
+            <a:r>
+              <a:rPr lang="en-US" dirty="0"/>
+              <a:t>and verbose API</a:t>
             </a:r>
           </a:p>
           <a:p>
             <a:pPr lvl="1"/>
             <a:r>
+              <a:rPr lang="en-US" dirty="0"/>
+              <a:t>Limited versioning capabilities</a:t>
+            </a:r>
+          </a:p>
+          <a:p>
+            <a:pPr lvl="1"/>
+            <a:r>
               <a:rPr lang="en-US" dirty="0" smtClean="0"/>
-              <a:t>Mixing HTML and code</a:t>
+              <a:t>No </a:t>
+            </a:r>
+            <a:r>
+              <a:rPr lang="en-US" dirty="0"/>
+              <a:t>developer isolation</a:t>
             </a:r>
           </a:p>
           <a:p>
             <a:pPr lvl="1"/>
             <a:r>
+              <a:rPr lang="en-US" dirty="0"/>
+              <a:t>Manual deployment of </a:t>
+            </a:r>
+            <a:r>
               <a:rPr lang="en-US" dirty="0" smtClean="0"/>
-              <a:t>Manual deployment</a:t>
+              <a:t>code</a:t>
             </a:r>
           </a:p>
           <a:p>
             <a:pPr lvl="1"/>
             <a:r>
-              <a:rPr lang="en-US" dirty="0" smtClean="0"/>
-              <a:t>Limited versioning capabilities</a:t>
+              <a:rPr lang="en-US" dirty="0"/>
+              <a:t>Very hard and manual testing</a:t>
             </a:r>
           </a:p>
           <a:p>
             <a:pPr lvl="1"/>
-            <a:r>
-              <a:rPr lang="en-US" dirty="0" smtClean="0"/>
-              <a:t>Very hard and manual testing</a:t>
-            </a:r>
+            <a:endParaRPr lang="en-US" dirty="0"/>
+          </a:p>
+          <a:p>
+            <a:pPr lvl="1"/>
             <a:endParaRPr lang="en-US" dirty="0" smtClean="0"/>
           </a:p>
           <a:p>
@@ -6728,6 +7303,1275 @@
       </p:par>
     </p:tnLst>
   </p:timing>
+</p:sld>
+</file>
+
+<file path=ppt/slides/slide3.xml><?xml version="1.0" encoding="utf-8"?>
+<p:sld xmlns:a="http://schemas.openxmlformats.org/drawingml/2006/main" xmlns:r="http://schemas.openxmlformats.org/officeDocument/2006/relationships" xmlns:p="http://schemas.openxmlformats.org/presentationml/2006/main">
+  <p:cSld>
+    <p:spTree>
+      <p:nvGrpSpPr>
+        <p:cNvPr id="1" name=""/>
+        <p:cNvGrpSpPr/>
+        <p:nvPr/>
+      </p:nvGrpSpPr>
+      <p:grpSpPr>
+        <a:xfrm>
+          <a:off x="0" y="0"/>
+          <a:ext cx="0" cy="0"/>
+          <a:chOff x="0" y="0"/>
+          <a:chExt cx="0" cy="0"/>
+        </a:xfrm>
+      </p:grpSpPr>
+      <p:sp>
+        <p:nvSpPr>
+          <p:cNvPr id="2" name="Title 1"/>
+          <p:cNvSpPr>
+            <a:spLocks noGrp="1"/>
+          </p:cNvSpPr>
+          <p:nvPr>
+            <p:ph type="title"/>
+          </p:nvPr>
+        </p:nvSpPr>
+        <p:spPr/>
+        <p:txBody>
+          <a:bodyPr/>
+          <a:lstStyle/>
+          <a:p>
+            <a:r>
+              <a:rPr lang="en-US" dirty="0" smtClean="0"/>
+              <a:t>The </a:t>
+            </a:r>
+            <a:r>
+              <a:rPr lang="en-US" dirty="0"/>
+              <a:t>(OLD</a:t>
+            </a:r>
+            <a:r>
+              <a:rPr lang="en-US" dirty="0" smtClean="0"/>
+              <a:t>) Sites </a:t>
+            </a:r>
+            <a:r>
+              <a:rPr lang="en-US" dirty="0"/>
+              <a:t>way</a:t>
+            </a:r>
+            <a:endParaRPr lang="en-US" dirty="0"/>
+          </a:p>
+        </p:txBody>
+      </p:sp>
+      <p:pic>
+        <p:nvPicPr>
+          <p:cNvPr id="6" name="Picture 5"/>
+          <p:cNvPicPr>
+            <a:picLocks noChangeAspect="1"/>
+          </p:cNvPicPr>
+          <p:nvPr/>
+        </p:nvPicPr>
+        <p:blipFill>
+          <a:blip r:embed="rId2"/>
+          <a:stretch>
+            <a:fillRect/>
+          </a:stretch>
+        </p:blipFill>
+        <p:spPr>
+          <a:xfrm>
+            <a:off x="0" y="1524000"/>
+            <a:ext cx="9144000" cy="4337732"/>
+          </a:xfrm>
+          <a:prstGeom prst="rect">
+            <a:avLst/>
+          </a:prstGeom>
+        </p:spPr>
+      </p:pic>
+      <p:sp>
+        <p:nvSpPr>
+          <p:cNvPr id="9" name="Multiply 8"/>
+          <p:cNvSpPr/>
+          <p:nvPr/>
+        </p:nvSpPr>
+        <p:spPr>
+          <a:xfrm>
+            <a:off x="918034" y="842149"/>
+            <a:ext cx="7068861" cy="5398044"/>
+          </a:xfrm>
+          <a:prstGeom prst="mathMultiply">
+            <a:avLst/>
+          </a:prstGeom>
+        </p:spPr>
+        <p:style>
+          <a:lnRef idx="2">
+            <a:schemeClr val="accent6">
+              <a:shade val="50000"/>
+            </a:schemeClr>
+          </a:lnRef>
+          <a:fillRef idx="1">
+            <a:schemeClr val="accent6"/>
+          </a:fillRef>
+          <a:effectRef idx="0">
+            <a:schemeClr val="accent6"/>
+          </a:effectRef>
+          <a:fontRef idx="minor">
+            <a:schemeClr val="lt1"/>
+          </a:fontRef>
+        </p:style>
+        <p:txBody>
+          <a:bodyPr rtlCol="0" anchor="ctr"/>
+          <a:lstStyle/>
+          <a:p>
+            <a:pPr algn="ctr"/>
+            <a:endParaRPr lang="en-US"/>
+          </a:p>
+        </p:txBody>
+      </p:sp>
+      <p:sp>
+        <p:nvSpPr>
+          <p:cNvPr id="7" name="Content Placeholder 2"/>
+          <p:cNvSpPr txBox="1">
+            <a:spLocks/>
+          </p:cNvSpPr>
+          <p:nvPr/>
+        </p:nvSpPr>
+        <p:spPr>
+          <a:xfrm>
+            <a:off x="220940" y="5971598"/>
+            <a:ext cx="8686800" cy="777486"/>
+          </a:xfrm>
+          <a:prstGeom prst="rect">
+            <a:avLst/>
+          </a:prstGeom>
+        </p:spPr>
+        <p:txBody>
+          <a:bodyPr/>
+          <a:lstStyle>
+            <a:lvl1pPr marL="182880" indent="-182880" algn="l" defTabSz="914400" rtl="0" eaLnBrk="1" latinLnBrk="0" hangingPunct="1">
+              <a:spcBef>
+                <a:spcPct val="20000"/>
+              </a:spcBef>
+              <a:buClr>
+                <a:schemeClr val="accent1"/>
+              </a:buClr>
+              <a:buSzPct val="85000"/>
+              <a:buFont typeface="Arial" pitchFamily="34" charset="0"/>
+              <a:buChar char="•"/>
+              <a:defRPr sz="3600" kern="1200">
+                <a:solidFill>
+                  <a:schemeClr val="tx1"/>
+                </a:solidFill>
+                <a:latin typeface="Bookman Old Style"/>
+                <a:ea typeface="+mn-ea"/>
+                <a:cs typeface="Bookman Old Style"/>
+              </a:defRPr>
+            </a:lvl1pPr>
+            <a:lvl2pPr marL="457200" indent="-182880" algn="l" defTabSz="914400" rtl="0" eaLnBrk="1" latinLnBrk="0" hangingPunct="1">
+              <a:spcBef>
+                <a:spcPct val="20000"/>
+              </a:spcBef>
+              <a:buClr>
+                <a:schemeClr val="accent1"/>
+              </a:buClr>
+              <a:buSzPct val="85000"/>
+              <a:buFont typeface="Arial" pitchFamily="34" charset="0"/>
+              <a:buChar char="•"/>
+              <a:defRPr sz="3200" kern="1200">
+                <a:solidFill>
+                  <a:schemeClr val="tx1"/>
+                </a:solidFill>
+                <a:latin typeface="Bookman Old Style"/>
+                <a:ea typeface="+mn-ea"/>
+                <a:cs typeface="Bookman Old Style"/>
+              </a:defRPr>
+            </a:lvl2pPr>
+            <a:lvl3pPr marL="731520" indent="-182880" algn="l" defTabSz="914400" rtl="0" eaLnBrk="1" latinLnBrk="0" hangingPunct="1">
+              <a:spcBef>
+                <a:spcPct val="20000"/>
+              </a:spcBef>
+              <a:buClr>
+                <a:schemeClr val="accent1"/>
+              </a:buClr>
+              <a:buSzPct val="90000"/>
+              <a:buFont typeface="Arial" pitchFamily="34" charset="0"/>
+              <a:buChar char="•"/>
+              <a:defRPr sz="2800" kern="1200">
+                <a:solidFill>
+                  <a:schemeClr val="tx1"/>
+                </a:solidFill>
+                <a:latin typeface="Bookman Old Style"/>
+                <a:ea typeface="+mn-ea"/>
+                <a:cs typeface="Bookman Old Style"/>
+              </a:defRPr>
+            </a:lvl3pPr>
+            <a:lvl4pPr marL="1005840" indent="-182880" algn="l" defTabSz="914400" rtl="0" eaLnBrk="1" latinLnBrk="0" hangingPunct="1">
+              <a:spcBef>
+                <a:spcPct val="20000"/>
+              </a:spcBef>
+              <a:buClr>
+                <a:schemeClr val="accent1"/>
+              </a:buClr>
+              <a:buFont typeface="Arial" pitchFamily="34" charset="0"/>
+              <a:buChar char="•"/>
+              <a:defRPr sz="2400" kern="1200">
+                <a:solidFill>
+                  <a:schemeClr val="tx1"/>
+                </a:solidFill>
+                <a:latin typeface="Bookman Old Style"/>
+                <a:ea typeface="+mn-ea"/>
+                <a:cs typeface="Bookman Old Style"/>
+              </a:defRPr>
+            </a:lvl4pPr>
+            <a:lvl5pPr marL="1188720" indent="-137160" algn="l" defTabSz="914400" rtl="0" eaLnBrk="1" latinLnBrk="0" hangingPunct="1">
+              <a:spcBef>
+                <a:spcPct val="20000"/>
+              </a:spcBef>
+              <a:buClr>
+                <a:schemeClr val="accent1"/>
+              </a:buClr>
+              <a:buSzPct val="100000"/>
+              <a:buFont typeface="Arial" pitchFamily="34" charset="0"/>
+              <a:buChar char="•"/>
+              <a:defRPr sz="2000" kern="1200" baseline="0">
+                <a:solidFill>
+                  <a:schemeClr val="tx1"/>
+                </a:solidFill>
+                <a:latin typeface="Bookman Old Style"/>
+                <a:ea typeface="+mn-ea"/>
+                <a:cs typeface="Bookman Old Style"/>
+              </a:defRPr>
+            </a:lvl5pPr>
+            <a:lvl6pPr marL="1371600" indent="-182880" algn="l" defTabSz="914400" rtl="0" eaLnBrk="1" latinLnBrk="0" hangingPunct="1">
+              <a:spcBef>
+                <a:spcPct val="20000"/>
+              </a:spcBef>
+              <a:buClr>
+                <a:schemeClr val="accent1"/>
+              </a:buClr>
+              <a:buFont typeface="Arial" pitchFamily="34" charset="0"/>
+              <a:buChar char="•"/>
+              <a:defRPr sz="1300" kern="1200">
+                <a:solidFill>
+                  <a:schemeClr val="tx1"/>
+                </a:solidFill>
+                <a:latin typeface="+mn-lt"/>
+                <a:ea typeface="+mn-ea"/>
+                <a:cs typeface="+mn-cs"/>
+              </a:defRPr>
+            </a:lvl6pPr>
+            <a:lvl7pPr marL="1554480" indent="-182880" algn="l" defTabSz="914400" rtl="0" eaLnBrk="1" latinLnBrk="0" hangingPunct="1">
+              <a:spcBef>
+                <a:spcPct val="20000"/>
+              </a:spcBef>
+              <a:buClr>
+                <a:schemeClr val="accent1"/>
+              </a:buClr>
+              <a:buFont typeface="Arial" pitchFamily="34" charset="0"/>
+              <a:buChar char="•"/>
+              <a:defRPr sz="1300" kern="1200">
+                <a:solidFill>
+                  <a:schemeClr val="tx1"/>
+                </a:solidFill>
+                <a:latin typeface="+mn-lt"/>
+                <a:ea typeface="+mn-ea"/>
+                <a:cs typeface="+mn-cs"/>
+              </a:defRPr>
+            </a:lvl7pPr>
+            <a:lvl8pPr marL="1737360" indent="-182880" algn="l" defTabSz="914400" rtl="0" eaLnBrk="1" latinLnBrk="0" hangingPunct="1">
+              <a:spcBef>
+                <a:spcPct val="20000"/>
+              </a:spcBef>
+              <a:buClr>
+                <a:schemeClr val="accent1"/>
+              </a:buClr>
+              <a:buFont typeface="Arial" pitchFamily="34" charset="0"/>
+              <a:buChar char="•"/>
+              <a:defRPr sz="1300" kern="1200">
+                <a:solidFill>
+                  <a:schemeClr val="tx1"/>
+                </a:solidFill>
+                <a:latin typeface="+mn-lt"/>
+                <a:ea typeface="+mn-ea"/>
+                <a:cs typeface="+mn-cs"/>
+              </a:defRPr>
+            </a:lvl8pPr>
+            <a:lvl9pPr marL="1920240" indent="-182880" algn="l" defTabSz="914400" rtl="0" eaLnBrk="1" latinLnBrk="0" hangingPunct="1">
+              <a:spcBef>
+                <a:spcPct val="20000"/>
+              </a:spcBef>
+              <a:buClr>
+                <a:schemeClr val="accent1"/>
+              </a:buClr>
+              <a:buFont typeface="Arial" pitchFamily="34" charset="0"/>
+              <a:buChar char="•"/>
+              <a:defRPr sz="1300" kern="1200">
+                <a:solidFill>
+                  <a:schemeClr val="tx1"/>
+                </a:solidFill>
+                <a:latin typeface="+mn-lt"/>
+                <a:ea typeface="+mn-ea"/>
+                <a:cs typeface="+mn-cs"/>
+              </a:defRPr>
+            </a:lvl9pPr>
+          </a:lstStyle>
+          <a:p>
+            <a:pPr marL="0" indent="0">
+              <a:buNone/>
+            </a:pPr>
+            <a:r>
+              <a:rPr lang="en-US" dirty="0" smtClean="0"/>
+              <a:t>HTML and Java Code Mixed </a:t>
+            </a:r>
+            <a:r>
+              <a:rPr lang="en-US" dirty="0" err="1" smtClean="0"/>
+              <a:t>Togeter</a:t>
+            </a:r>
+            <a:endParaRPr lang="en-US" dirty="0"/>
+          </a:p>
+        </p:txBody>
+      </p:sp>
+    </p:spTree>
+    <p:extLst>
+      <p:ext uri="{BB962C8B-B14F-4D97-AF65-F5344CB8AC3E}">
+        <p14:creationId xmlns:p14="http://schemas.microsoft.com/office/powerpoint/2010/main" val="1241130794"/>
+      </p:ext>
+    </p:extLst>
+  </p:cSld>
+  <p:clrMapOvr>
+    <a:masterClrMapping/>
+  </p:clrMapOvr>
+</p:sld>
+</file>
+
+<file path=ppt/slides/slide4.xml><?xml version="1.0" encoding="utf-8"?>
+<p:sld xmlns:a="http://schemas.openxmlformats.org/drawingml/2006/main" xmlns:r="http://schemas.openxmlformats.org/officeDocument/2006/relationships" xmlns:p="http://schemas.openxmlformats.org/presentationml/2006/main">
+  <p:cSld>
+    <p:spTree>
+      <p:nvGrpSpPr>
+        <p:cNvPr id="1" name=""/>
+        <p:cNvGrpSpPr/>
+        <p:nvPr/>
+      </p:nvGrpSpPr>
+      <p:grpSpPr>
+        <a:xfrm>
+          <a:off x="0" y="0"/>
+          <a:ext cx="0" cy="0"/>
+          <a:chOff x="0" y="0"/>
+          <a:chExt cx="0" cy="0"/>
+        </a:xfrm>
+      </p:grpSpPr>
+      <p:sp>
+        <p:nvSpPr>
+          <p:cNvPr id="2" name="Title 1"/>
+          <p:cNvSpPr>
+            <a:spLocks noGrp="1"/>
+          </p:cNvSpPr>
+          <p:nvPr>
+            <p:ph type="title"/>
+          </p:nvPr>
+        </p:nvSpPr>
+        <p:spPr>
+          <a:xfrm>
+            <a:off x="457200" y="533400"/>
+            <a:ext cx="8539532" cy="990600"/>
+          </a:xfrm>
+        </p:spPr>
+        <p:txBody>
+          <a:bodyPr/>
+          <a:lstStyle/>
+          <a:p>
+            <a:r>
+              <a:rPr lang="en-US" dirty="0" smtClean="0"/>
+              <a:t>The </a:t>
+            </a:r>
+            <a:r>
+              <a:rPr lang="en-US" dirty="0" err="1" smtClean="0"/>
+              <a:t>AgileSites</a:t>
+            </a:r>
+            <a:r>
+              <a:rPr lang="en-US" dirty="0" smtClean="0"/>
+              <a:t> way (NEW)</a:t>
+            </a:r>
+            <a:endParaRPr lang="en-US" dirty="0"/>
+          </a:p>
+        </p:txBody>
+      </p:sp>
+      <p:pic>
+        <p:nvPicPr>
+          <p:cNvPr id="4" name="Content Placeholder 3"/>
+          <p:cNvPicPr>
+            <a:picLocks noGrp="1" noChangeAspect="1"/>
+          </p:cNvPicPr>
+          <p:nvPr>
+            <p:ph idx="1"/>
+          </p:nvPr>
+        </p:nvPicPr>
+        <p:blipFill>
+          <a:blip r:embed="rId2"/>
+          <a:srcRect t="1256" b="1256"/>
+          <a:stretch>
+            <a:fillRect/>
+          </a:stretch>
+        </p:blipFill>
+        <p:spPr>
+          <a:xfrm>
+            <a:off x="153493" y="1600201"/>
+            <a:ext cx="4917841" cy="2914276"/>
+          </a:xfrm>
+        </p:spPr>
+      </p:pic>
+      <p:pic>
+        <p:nvPicPr>
+          <p:cNvPr id="5" name="Picture 4"/>
+          <p:cNvPicPr>
+            <a:picLocks noChangeAspect="1"/>
+          </p:cNvPicPr>
+          <p:nvPr/>
+        </p:nvPicPr>
+        <p:blipFill>
+          <a:blip r:embed="rId3"/>
+          <a:stretch>
+            <a:fillRect/>
+          </a:stretch>
+        </p:blipFill>
+        <p:spPr>
+          <a:xfrm>
+            <a:off x="3395997" y="4200322"/>
+            <a:ext cx="5748002" cy="2657678"/>
+          </a:xfrm>
+          <a:prstGeom prst="rect">
+            <a:avLst/>
+          </a:prstGeom>
+        </p:spPr>
+      </p:pic>
+      <p:sp>
+        <p:nvSpPr>
+          <p:cNvPr id="6" name="Circular Arrow 5"/>
+          <p:cNvSpPr/>
+          <p:nvPr/>
+        </p:nvSpPr>
+        <p:spPr>
+          <a:xfrm rot="21003389" flipV="1">
+            <a:off x="1965214" y="3288483"/>
+            <a:ext cx="1972737" cy="2115834"/>
+          </a:xfrm>
+          <a:prstGeom prst="circularArrow">
+            <a:avLst>
+              <a:gd name="adj1" fmla="val 10895"/>
+              <a:gd name="adj2" fmla="val 2130165"/>
+              <a:gd name="adj3" fmla="val 15674555"/>
+              <a:gd name="adj4" fmla="val 9789393"/>
+              <a:gd name="adj5" fmla="val 18218"/>
+            </a:avLst>
+          </a:prstGeom>
+        </p:spPr>
+        <p:style>
+          <a:lnRef idx="1">
+            <a:schemeClr val="accent1"/>
+          </a:lnRef>
+          <a:fillRef idx="3">
+            <a:schemeClr val="accent1"/>
+          </a:fillRef>
+          <a:effectRef idx="2">
+            <a:schemeClr val="accent1"/>
+          </a:effectRef>
+          <a:fontRef idx="minor">
+            <a:schemeClr val="lt1"/>
+          </a:fontRef>
+        </p:style>
+        <p:txBody>
+          <a:bodyPr rtlCol="0" anchor="ctr"/>
+          <a:lstStyle/>
+          <a:p>
+            <a:pPr algn="ctr"/>
+            <a:endParaRPr lang="en-US">
+              <a:solidFill>
+                <a:schemeClr val="tx1"/>
+              </a:solidFill>
+            </a:endParaRPr>
+          </a:p>
+        </p:txBody>
+      </p:sp>
+      <p:sp>
+        <p:nvSpPr>
+          <p:cNvPr id="8" name="Content Placeholder 2"/>
+          <p:cNvSpPr txBox="1">
+            <a:spLocks/>
+          </p:cNvSpPr>
+          <p:nvPr/>
+        </p:nvSpPr>
+        <p:spPr>
+          <a:xfrm>
+            <a:off x="5276037" y="1524000"/>
+            <a:ext cx="3276979" cy="1532927"/>
+          </a:xfrm>
+          <a:prstGeom prst="rect">
+            <a:avLst/>
+          </a:prstGeom>
+        </p:spPr>
+        <p:txBody>
+          <a:bodyPr/>
+          <a:lstStyle>
+            <a:lvl1pPr marL="182880" indent="-182880" algn="l" defTabSz="914400" rtl="0" eaLnBrk="1" latinLnBrk="0" hangingPunct="1">
+              <a:spcBef>
+                <a:spcPct val="20000"/>
+              </a:spcBef>
+              <a:buClr>
+                <a:schemeClr val="accent1"/>
+              </a:buClr>
+              <a:buSzPct val="85000"/>
+              <a:buFont typeface="Arial" pitchFamily="34" charset="0"/>
+              <a:buChar char="•"/>
+              <a:defRPr sz="3600" kern="1200">
+                <a:solidFill>
+                  <a:schemeClr val="tx1"/>
+                </a:solidFill>
+                <a:latin typeface="Bookman Old Style"/>
+                <a:ea typeface="+mn-ea"/>
+                <a:cs typeface="Bookman Old Style"/>
+              </a:defRPr>
+            </a:lvl1pPr>
+            <a:lvl2pPr marL="457200" indent="-182880" algn="l" defTabSz="914400" rtl="0" eaLnBrk="1" latinLnBrk="0" hangingPunct="1">
+              <a:spcBef>
+                <a:spcPct val="20000"/>
+              </a:spcBef>
+              <a:buClr>
+                <a:schemeClr val="accent1"/>
+              </a:buClr>
+              <a:buSzPct val="85000"/>
+              <a:buFont typeface="Arial" pitchFamily="34" charset="0"/>
+              <a:buChar char="•"/>
+              <a:defRPr sz="3200" kern="1200">
+                <a:solidFill>
+                  <a:schemeClr val="tx1"/>
+                </a:solidFill>
+                <a:latin typeface="Bookman Old Style"/>
+                <a:ea typeface="+mn-ea"/>
+                <a:cs typeface="Bookman Old Style"/>
+              </a:defRPr>
+            </a:lvl2pPr>
+            <a:lvl3pPr marL="731520" indent="-182880" algn="l" defTabSz="914400" rtl="0" eaLnBrk="1" latinLnBrk="0" hangingPunct="1">
+              <a:spcBef>
+                <a:spcPct val="20000"/>
+              </a:spcBef>
+              <a:buClr>
+                <a:schemeClr val="accent1"/>
+              </a:buClr>
+              <a:buSzPct val="90000"/>
+              <a:buFont typeface="Arial" pitchFamily="34" charset="0"/>
+              <a:buChar char="•"/>
+              <a:defRPr sz="2800" kern="1200">
+                <a:solidFill>
+                  <a:schemeClr val="tx1"/>
+                </a:solidFill>
+                <a:latin typeface="Bookman Old Style"/>
+                <a:ea typeface="+mn-ea"/>
+                <a:cs typeface="Bookman Old Style"/>
+              </a:defRPr>
+            </a:lvl3pPr>
+            <a:lvl4pPr marL="1005840" indent="-182880" algn="l" defTabSz="914400" rtl="0" eaLnBrk="1" latinLnBrk="0" hangingPunct="1">
+              <a:spcBef>
+                <a:spcPct val="20000"/>
+              </a:spcBef>
+              <a:buClr>
+                <a:schemeClr val="accent1"/>
+              </a:buClr>
+              <a:buFont typeface="Arial" pitchFamily="34" charset="0"/>
+              <a:buChar char="•"/>
+              <a:defRPr sz="2400" kern="1200">
+                <a:solidFill>
+                  <a:schemeClr val="tx1"/>
+                </a:solidFill>
+                <a:latin typeface="Bookman Old Style"/>
+                <a:ea typeface="+mn-ea"/>
+                <a:cs typeface="Bookman Old Style"/>
+              </a:defRPr>
+            </a:lvl4pPr>
+            <a:lvl5pPr marL="1188720" indent="-137160" algn="l" defTabSz="914400" rtl="0" eaLnBrk="1" latinLnBrk="0" hangingPunct="1">
+              <a:spcBef>
+                <a:spcPct val="20000"/>
+              </a:spcBef>
+              <a:buClr>
+                <a:schemeClr val="accent1"/>
+              </a:buClr>
+              <a:buSzPct val="100000"/>
+              <a:buFont typeface="Arial" pitchFamily="34" charset="0"/>
+              <a:buChar char="•"/>
+              <a:defRPr sz="2000" kern="1200" baseline="0">
+                <a:solidFill>
+                  <a:schemeClr val="tx1"/>
+                </a:solidFill>
+                <a:latin typeface="Bookman Old Style"/>
+                <a:ea typeface="+mn-ea"/>
+                <a:cs typeface="Bookman Old Style"/>
+              </a:defRPr>
+            </a:lvl5pPr>
+            <a:lvl6pPr marL="1371600" indent="-182880" algn="l" defTabSz="914400" rtl="0" eaLnBrk="1" latinLnBrk="0" hangingPunct="1">
+              <a:spcBef>
+                <a:spcPct val="20000"/>
+              </a:spcBef>
+              <a:buClr>
+                <a:schemeClr val="accent1"/>
+              </a:buClr>
+              <a:buFont typeface="Arial" pitchFamily="34" charset="0"/>
+              <a:buChar char="•"/>
+              <a:defRPr sz="1300" kern="1200">
+                <a:solidFill>
+                  <a:schemeClr val="tx1"/>
+                </a:solidFill>
+                <a:latin typeface="+mn-lt"/>
+                <a:ea typeface="+mn-ea"/>
+                <a:cs typeface="+mn-cs"/>
+              </a:defRPr>
+            </a:lvl6pPr>
+            <a:lvl7pPr marL="1554480" indent="-182880" algn="l" defTabSz="914400" rtl="0" eaLnBrk="1" latinLnBrk="0" hangingPunct="1">
+              <a:spcBef>
+                <a:spcPct val="20000"/>
+              </a:spcBef>
+              <a:buClr>
+                <a:schemeClr val="accent1"/>
+              </a:buClr>
+              <a:buFont typeface="Arial" pitchFamily="34" charset="0"/>
+              <a:buChar char="•"/>
+              <a:defRPr sz="1300" kern="1200">
+                <a:solidFill>
+                  <a:schemeClr val="tx1"/>
+                </a:solidFill>
+                <a:latin typeface="+mn-lt"/>
+                <a:ea typeface="+mn-ea"/>
+                <a:cs typeface="+mn-cs"/>
+              </a:defRPr>
+            </a:lvl7pPr>
+            <a:lvl8pPr marL="1737360" indent="-182880" algn="l" defTabSz="914400" rtl="0" eaLnBrk="1" latinLnBrk="0" hangingPunct="1">
+              <a:spcBef>
+                <a:spcPct val="20000"/>
+              </a:spcBef>
+              <a:buClr>
+                <a:schemeClr val="accent1"/>
+              </a:buClr>
+              <a:buFont typeface="Arial" pitchFamily="34" charset="0"/>
+              <a:buChar char="•"/>
+              <a:defRPr sz="1300" kern="1200">
+                <a:solidFill>
+                  <a:schemeClr val="tx1"/>
+                </a:solidFill>
+                <a:latin typeface="+mn-lt"/>
+                <a:ea typeface="+mn-ea"/>
+                <a:cs typeface="+mn-cs"/>
+              </a:defRPr>
+            </a:lvl8pPr>
+            <a:lvl9pPr marL="1920240" indent="-182880" algn="l" defTabSz="914400" rtl="0" eaLnBrk="1" latinLnBrk="0" hangingPunct="1">
+              <a:spcBef>
+                <a:spcPct val="20000"/>
+              </a:spcBef>
+              <a:buClr>
+                <a:schemeClr val="accent1"/>
+              </a:buClr>
+              <a:buFont typeface="Arial" pitchFamily="34" charset="0"/>
+              <a:buChar char="•"/>
+              <a:defRPr sz="1300" kern="1200">
+                <a:solidFill>
+                  <a:schemeClr val="tx1"/>
+                </a:solidFill>
+                <a:latin typeface="+mn-lt"/>
+                <a:ea typeface="+mn-ea"/>
+                <a:cs typeface="+mn-cs"/>
+              </a:defRPr>
+            </a:lvl9pPr>
+          </a:lstStyle>
+          <a:p>
+            <a:pPr marL="0" indent="0">
+              <a:buNone/>
+            </a:pPr>
+            <a:r>
+              <a:rPr lang="en-US" dirty="0" smtClean="0"/>
+              <a:t>Clean </a:t>
+            </a:r>
+          </a:p>
+          <a:p>
+            <a:pPr marL="0" indent="0">
+              <a:buNone/>
+            </a:pPr>
+            <a:r>
+              <a:rPr lang="en-US" b="1" dirty="0" smtClean="0"/>
+              <a:t>Java only </a:t>
+            </a:r>
+            <a:br>
+              <a:rPr lang="en-US" b="1" dirty="0" smtClean="0"/>
+            </a:br>
+            <a:r>
+              <a:rPr lang="en-US" dirty="0" smtClean="0"/>
+              <a:t>code…</a:t>
+            </a:r>
+            <a:endParaRPr lang="en-US" dirty="0"/>
+          </a:p>
+        </p:txBody>
+      </p:sp>
+      <p:sp>
+        <p:nvSpPr>
+          <p:cNvPr id="9" name="Content Placeholder 2"/>
+          <p:cNvSpPr txBox="1">
+            <a:spLocks/>
+          </p:cNvSpPr>
+          <p:nvPr/>
+        </p:nvSpPr>
+        <p:spPr>
+          <a:xfrm>
+            <a:off x="153493" y="4952589"/>
+            <a:ext cx="4753937" cy="905169"/>
+          </a:xfrm>
+          <a:prstGeom prst="rect">
+            <a:avLst/>
+          </a:prstGeom>
+        </p:spPr>
+        <p:txBody>
+          <a:bodyPr/>
+          <a:lstStyle>
+            <a:lvl1pPr marL="182880" indent="-182880" algn="l" defTabSz="914400" rtl="0" eaLnBrk="1" latinLnBrk="0" hangingPunct="1">
+              <a:spcBef>
+                <a:spcPct val="20000"/>
+              </a:spcBef>
+              <a:buClr>
+                <a:schemeClr val="accent1"/>
+              </a:buClr>
+              <a:buSzPct val="85000"/>
+              <a:buFont typeface="Arial" pitchFamily="34" charset="0"/>
+              <a:buChar char="•"/>
+              <a:defRPr sz="3600" kern="1200">
+                <a:solidFill>
+                  <a:schemeClr val="tx1"/>
+                </a:solidFill>
+                <a:latin typeface="Bookman Old Style"/>
+                <a:ea typeface="+mn-ea"/>
+                <a:cs typeface="Bookman Old Style"/>
+              </a:defRPr>
+            </a:lvl1pPr>
+            <a:lvl2pPr marL="457200" indent="-182880" algn="l" defTabSz="914400" rtl="0" eaLnBrk="1" latinLnBrk="0" hangingPunct="1">
+              <a:spcBef>
+                <a:spcPct val="20000"/>
+              </a:spcBef>
+              <a:buClr>
+                <a:schemeClr val="accent1"/>
+              </a:buClr>
+              <a:buSzPct val="85000"/>
+              <a:buFont typeface="Arial" pitchFamily="34" charset="0"/>
+              <a:buChar char="•"/>
+              <a:defRPr sz="3200" kern="1200">
+                <a:solidFill>
+                  <a:schemeClr val="tx1"/>
+                </a:solidFill>
+                <a:latin typeface="Bookman Old Style"/>
+                <a:ea typeface="+mn-ea"/>
+                <a:cs typeface="Bookman Old Style"/>
+              </a:defRPr>
+            </a:lvl2pPr>
+            <a:lvl3pPr marL="731520" indent="-182880" algn="l" defTabSz="914400" rtl="0" eaLnBrk="1" latinLnBrk="0" hangingPunct="1">
+              <a:spcBef>
+                <a:spcPct val="20000"/>
+              </a:spcBef>
+              <a:buClr>
+                <a:schemeClr val="accent1"/>
+              </a:buClr>
+              <a:buSzPct val="90000"/>
+              <a:buFont typeface="Arial" pitchFamily="34" charset="0"/>
+              <a:buChar char="•"/>
+              <a:defRPr sz="2800" kern="1200">
+                <a:solidFill>
+                  <a:schemeClr val="tx1"/>
+                </a:solidFill>
+                <a:latin typeface="Bookman Old Style"/>
+                <a:ea typeface="+mn-ea"/>
+                <a:cs typeface="Bookman Old Style"/>
+              </a:defRPr>
+            </a:lvl3pPr>
+            <a:lvl4pPr marL="1005840" indent="-182880" algn="l" defTabSz="914400" rtl="0" eaLnBrk="1" latinLnBrk="0" hangingPunct="1">
+              <a:spcBef>
+                <a:spcPct val="20000"/>
+              </a:spcBef>
+              <a:buClr>
+                <a:schemeClr val="accent1"/>
+              </a:buClr>
+              <a:buFont typeface="Arial" pitchFamily="34" charset="0"/>
+              <a:buChar char="•"/>
+              <a:defRPr sz="2400" kern="1200">
+                <a:solidFill>
+                  <a:schemeClr val="tx1"/>
+                </a:solidFill>
+                <a:latin typeface="Bookman Old Style"/>
+                <a:ea typeface="+mn-ea"/>
+                <a:cs typeface="Bookman Old Style"/>
+              </a:defRPr>
+            </a:lvl4pPr>
+            <a:lvl5pPr marL="1188720" indent="-137160" algn="l" defTabSz="914400" rtl="0" eaLnBrk="1" latinLnBrk="0" hangingPunct="1">
+              <a:spcBef>
+                <a:spcPct val="20000"/>
+              </a:spcBef>
+              <a:buClr>
+                <a:schemeClr val="accent1"/>
+              </a:buClr>
+              <a:buSzPct val="100000"/>
+              <a:buFont typeface="Arial" pitchFamily="34" charset="0"/>
+              <a:buChar char="•"/>
+              <a:defRPr sz="2000" kern="1200" baseline="0">
+                <a:solidFill>
+                  <a:schemeClr val="tx1"/>
+                </a:solidFill>
+                <a:latin typeface="Bookman Old Style"/>
+                <a:ea typeface="+mn-ea"/>
+                <a:cs typeface="Bookman Old Style"/>
+              </a:defRPr>
+            </a:lvl5pPr>
+            <a:lvl6pPr marL="1371600" indent="-182880" algn="l" defTabSz="914400" rtl="0" eaLnBrk="1" latinLnBrk="0" hangingPunct="1">
+              <a:spcBef>
+                <a:spcPct val="20000"/>
+              </a:spcBef>
+              <a:buClr>
+                <a:schemeClr val="accent1"/>
+              </a:buClr>
+              <a:buFont typeface="Arial" pitchFamily="34" charset="0"/>
+              <a:buChar char="•"/>
+              <a:defRPr sz="1300" kern="1200">
+                <a:solidFill>
+                  <a:schemeClr val="tx1"/>
+                </a:solidFill>
+                <a:latin typeface="+mn-lt"/>
+                <a:ea typeface="+mn-ea"/>
+                <a:cs typeface="+mn-cs"/>
+              </a:defRPr>
+            </a:lvl6pPr>
+            <a:lvl7pPr marL="1554480" indent="-182880" algn="l" defTabSz="914400" rtl="0" eaLnBrk="1" latinLnBrk="0" hangingPunct="1">
+              <a:spcBef>
+                <a:spcPct val="20000"/>
+              </a:spcBef>
+              <a:buClr>
+                <a:schemeClr val="accent1"/>
+              </a:buClr>
+              <a:buFont typeface="Arial" pitchFamily="34" charset="0"/>
+              <a:buChar char="•"/>
+              <a:defRPr sz="1300" kern="1200">
+                <a:solidFill>
+                  <a:schemeClr val="tx1"/>
+                </a:solidFill>
+                <a:latin typeface="+mn-lt"/>
+                <a:ea typeface="+mn-ea"/>
+                <a:cs typeface="+mn-cs"/>
+              </a:defRPr>
+            </a:lvl7pPr>
+            <a:lvl8pPr marL="1737360" indent="-182880" algn="l" defTabSz="914400" rtl="0" eaLnBrk="1" latinLnBrk="0" hangingPunct="1">
+              <a:spcBef>
+                <a:spcPct val="20000"/>
+              </a:spcBef>
+              <a:buClr>
+                <a:schemeClr val="accent1"/>
+              </a:buClr>
+              <a:buFont typeface="Arial" pitchFamily="34" charset="0"/>
+              <a:buChar char="•"/>
+              <a:defRPr sz="1300" kern="1200">
+                <a:solidFill>
+                  <a:schemeClr val="tx1"/>
+                </a:solidFill>
+                <a:latin typeface="+mn-lt"/>
+                <a:ea typeface="+mn-ea"/>
+                <a:cs typeface="+mn-cs"/>
+              </a:defRPr>
+            </a:lvl8pPr>
+            <a:lvl9pPr marL="1920240" indent="-182880" algn="l" defTabSz="914400" rtl="0" eaLnBrk="1" latinLnBrk="0" hangingPunct="1">
+              <a:spcBef>
+                <a:spcPct val="20000"/>
+              </a:spcBef>
+              <a:buClr>
+                <a:schemeClr val="accent1"/>
+              </a:buClr>
+              <a:buFont typeface="Arial" pitchFamily="34" charset="0"/>
+              <a:buChar char="•"/>
+              <a:defRPr sz="1300" kern="1200">
+                <a:solidFill>
+                  <a:schemeClr val="tx1"/>
+                </a:solidFill>
+                <a:latin typeface="+mn-lt"/>
+                <a:ea typeface="+mn-ea"/>
+                <a:cs typeface="+mn-cs"/>
+              </a:defRPr>
+            </a:lvl9pPr>
+          </a:lstStyle>
+          <a:p>
+            <a:pPr marL="0" indent="0">
+              <a:buNone/>
+            </a:pPr>
+            <a:r>
+              <a:rPr lang="en-US" dirty="0" smtClean="0"/>
+              <a:t>…refers to the </a:t>
+            </a:r>
+            <a:br>
+              <a:rPr lang="en-US" dirty="0" smtClean="0"/>
+            </a:br>
+            <a:r>
+              <a:rPr lang="en-US" b="1" dirty="0" smtClean="0"/>
+              <a:t>pure HTML </a:t>
+            </a:r>
+            <a:r>
+              <a:rPr lang="en-US" dirty="0" smtClean="0"/>
+              <a:t>mockup</a:t>
+            </a:r>
+            <a:endParaRPr lang="en-US" dirty="0"/>
+          </a:p>
+        </p:txBody>
+      </p:sp>
+    </p:spTree>
+    <p:extLst>
+      <p:ext uri="{BB962C8B-B14F-4D97-AF65-F5344CB8AC3E}">
+        <p14:creationId xmlns:p14="http://schemas.microsoft.com/office/powerpoint/2010/main" val="3007900180"/>
+      </p:ext>
+    </p:extLst>
+  </p:cSld>
+  <p:clrMapOvr>
+    <a:masterClrMapping/>
+  </p:clrMapOvr>
+</p:sld>
+</file>
+
+<file path=ppt/slides/slide5.xml><?xml version="1.0" encoding="utf-8"?>
+<p:sld xmlns:a="http://schemas.openxmlformats.org/drawingml/2006/main" xmlns:r="http://schemas.openxmlformats.org/officeDocument/2006/relationships" xmlns:p="http://schemas.openxmlformats.org/presentationml/2006/main">
+  <p:cSld>
+    <p:spTree>
+      <p:nvGrpSpPr>
+        <p:cNvPr id="1" name=""/>
+        <p:cNvGrpSpPr/>
+        <p:nvPr/>
+      </p:nvGrpSpPr>
+      <p:grpSpPr>
+        <a:xfrm>
+          <a:off x="0" y="0"/>
+          <a:ext cx="0" cy="0"/>
+          <a:chOff x="0" y="0"/>
+          <a:chExt cx="0" cy="0"/>
+        </a:xfrm>
+      </p:grpSpPr>
+      <p:sp>
+        <p:nvSpPr>
+          <p:cNvPr id="2" name="Title 1"/>
+          <p:cNvSpPr>
+            <a:spLocks noGrp="1"/>
+          </p:cNvSpPr>
+          <p:nvPr>
+            <p:ph type="title"/>
+          </p:nvPr>
+        </p:nvSpPr>
+        <p:spPr/>
+        <p:txBody>
+          <a:bodyPr/>
+          <a:lstStyle/>
+          <a:p>
+            <a:r>
+              <a:rPr lang="en-US" dirty="0" smtClean="0"/>
+              <a:t>Edit. Save. Test!</a:t>
+            </a:r>
+            <a:endParaRPr lang="en-US" dirty="0"/>
+          </a:p>
+        </p:txBody>
+      </p:sp>
+    </p:spTree>
+    <p:extLst>
+      <p:ext uri="{BB962C8B-B14F-4D97-AF65-F5344CB8AC3E}">
+        <p14:creationId xmlns:p14="http://schemas.microsoft.com/office/powerpoint/2010/main" val="137846895"/>
+      </p:ext>
+    </p:extLst>
+  </p:cSld>
+  <p:clrMapOvr>
+    <a:masterClrMapping/>
+  </p:clrMapOvr>
+</p:sld>
+</file>
+
+<file path=ppt/slides/slide6.xml><?xml version="1.0" encoding="utf-8"?>
+<p:sld xmlns:a="http://schemas.openxmlformats.org/drawingml/2006/main" xmlns:r="http://schemas.openxmlformats.org/officeDocument/2006/relationships" xmlns:p="http://schemas.openxmlformats.org/presentationml/2006/main">
+  <p:cSld>
+    <p:spTree>
+      <p:nvGrpSpPr>
+        <p:cNvPr id="1" name=""/>
+        <p:cNvGrpSpPr/>
+        <p:nvPr/>
+      </p:nvGrpSpPr>
+      <p:grpSpPr>
+        <a:xfrm>
+          <a:off x="0" y="0"/>
+          <a:ext cx="0" cy="0"/>
+          <a:chOff x="0" y="0"/>
+          <a:chExt cx="0" cy="0"/>
+        </a:xfrm>
+      </p:grpSpPr>
+      <p:sp>
+        <p:nvSpPr>
+          <p:cNvPr id="2" name="Title 1"/>
+          <p:cNvSpPr>
+            <a:spLocks noGrp="1"/>
+          </p:cNvSpPr>
+          <p:nvPr>
+            <p:ph type="title"/>
+          </p:nvPr>
+        </p:nvSpPr>
+        <p:spPr/>
+        <p:txBody>
+          <a:bodyPr/>
+          <a:lstStyle/>
+          <a:p>
+            <a:r>
+              <a:rPr lang="en-US" dirty="0" err="1" smtClean="0"/>
+              <a:t>jQuery</a:t>
+            </a:r>
+            <a:r>
+              <a:rPr lang="en-US" dirty="0"/>
+              <a:t>-</a:t>
+            </a:r>
+            <a:r>
+              <a:rPr lang="en-US" dirty="0" smtClean="0"/>
+              <a:t>Like HTML picker</a:t>
+            </a:r>
+            <a:endParaRPr lang="en-US" dirty="0"/>
+          </a:p>
+        </p:txBody>
+      </p:sp>
+      <p:sp>
+        <p:nvSpPr>
+          <p:cNvPr id="3" name="Content Placeholder 2"/>
+          <p:cNvSpPr>
+            <a:spLocks noGrp="1"/>
+          </p:cNvSpPr>
+          <p:nvPr>
+            <p:ph idx="1"/>
+          </p:nvPr>
+        </p:nvSpPr>
+        <p:spPr/>
+        <p:txBody>
+          <a:bodyPr/>
+          <a:lstStyle/>
+          <a:p>
+            <a:endParaRPr lang="en-US"/>
+          </a:p>
+        </p:txBody>
+      </p:sp>
+    </p:spTree>
+    <p:extLst>
+      <p:ext uri="{BB962C8B-B14F-4D97-AF65-F5344CB8AC3E}">
+        <p14:creationId xmlns:p14="http://schemas.microsoft.com/office/powerpoint/2010/main" val="1189666875"/>
+      </p:ext>
+    </p:extLst>
+  </p:cSld>
+  <p:clrMapOvr>
+    <a:masterClrMapping/>
+  </p:clrMapOvr>
+</p:sld>
+</file>
+
+<file path=ppt/slides/slide7.xml><?xml version="1.0" encoding="utf-8"?>
+<p:sld xmlns:a="http://schemas.openxmlformats.org/drawingml/2006/main" xmlns:r="http://schemas.openxmlformats.org/officeDocument/2006/relationships" xmlns:p="http://schemas.openxmlformats.org/presentationml/2006/main">
+  <p:cSld>
+    <p:spTree>
+      <p:nvGrpSpPr>
+        <p:cNvPr id="1" name=""/>
+        <p:cNvGrpSpPr/>
+        <p:nvPr/>
+      </p:nvGrpSpPr>
+      <p:grpSpPr>
+        <a:xfrm>
+          <a:off x="0" y="0"/>
+          <a:ext cx="0" cy="0"/>
+          <a:chOff x="0" y="0"/>
+          <a:chExt cx="0" cy="0"/>
+        </a:xfrm>
+      </p:grpSpPr>
+      <p:sp>
+        <p:nvSpPr>
+          <p:cNvPr id="2" name="Title 1"/>
+          <p:cNvSpPr>
+            <a:spLocks noGrp="1"/>
+          </p:cNvSpPr>
+          <p:nvPr>
+            <p:ph type="title"/>
+          </p:nvPr>
+        </p:nvSpPr>
+        <p:spPr/>
+        <p:txBody>
+          <a:bodyPr/>
+          <a:lstStyle/>
+          <a:p>
+            <a:r>
+              <a:rPr lang="en-US" dirty="0" smtClean="0"/>
+              <a:t>You got a build. Finally!</a:t>
+            </a:r>
+            <a:endParaRPr lang="en-US" dirty="0"/>
+          </a:p>
+        </p:txBody>
+      </p:sp>
+      <p:sp>
+        <p:nvSpPr>
+          <p:cNvPr id="3" name="Content Placeholder 2"/>
+          <p:cNvSpPr>
+            <a:spLocks noGrp="1"/>
+          </p:cNvSpPr>
+          <p:nvPr>
+            <p:ph idx="1"/>
+          </p:nvPr>
+        </p:nvSpPr>
+        <p:spPr/>
+        <p:txBody>
+          <a:bodyPr/>
+          <a:lstStyle/>
+          <a:p>
+            <a:endParaRPr lang="en-US"/>
+          </a:p>
+        </p:txBody>
+      </p:sp>
+    </p:spTree>
+    <p:extLst>
+      <p:ext uri="{BB962C8B-B14F-4D97-AF65-F5344CB8AC3E}">
+        <p14:creationId xmlns:p14="http://schemas.microsoft.com/office/powerpoint/2010/main" val="3986596101"/>
+      </p:ext>
+    </p:extLst>
+  </p:cSld>
+  <p:clrMapOvr>
+    <a:masterClrMapping/>
+  </p:clrMapOvr>
+</p:sld>
+</file>
+
+<file path=ppt/slides/slide8.xml><?xml version="1.0" encoding="utf-8"?>
+<p:sld xmlns:a="http://schemas.openxmlformats.org/drawingml/2006/main" xmlns:r="http://schemas.openxmlformats.org/officeDocument/2006/relationships" xmlns:p="http://schemas.openxmlformats.org/presentationml/2006/main">
+  <p:cSld>
+    <p:spTree>
+      <p:nvGrpSpPr>
+        <p:cNvPr id="1" name=""/>
+        <p:cNvGrpSpPr/>
+        <p:nvPr/>
+      </p:nvGrpSpPr>
+      <p:grpSpPr>
+        <a:xfrm>
+          <a:off x="0" y="0"/>
+          <a:ext cx="0" cy="0"/>
+          <a:chOff x="0" y="0"/>
+          <a:chExt cx="0" cy="0"/>
+        </a:xfrm>
+      </p:grpSpPr>
+      <p:sp>
+        <p:nvSpPr>
+          <p:cNvPr id="2" name="Title 1"/>
+          <p:cNvSpPr>
+            <a:spLocks noGrp="1"/>
+          </p:cNvSpPr>
+          <p:nvPr>
+            <p:ph type="title"/>
+          </p:nvPr>
+        </p:nvSpPr>
+        <p:spPr/>
+        <p:txBody>
+          <a:bodyPr/>
+          <a:lstStyle/>
+          <a:p>
+            <a:r>
+              <a:rPr lang="en-US" dirty="0" smtClean="0"/>
+              <a:t>Tota</a:t>
+            </a:r>
+            <a:r>
+              <a:rPr lang="en-US" dirty="0" smtClean="0"/>
+              <a:t>l </a:t>
+            </a:r>
+            <a:r>
+              <a:rPr lang="en-US" dirty="0" smtClean="0"/>
+              <a:t>Tools </a:t>
+            </a:r>
+            <a:r>
+              <a:rPr lang="en-US" dirty="0" err="1" smtClean="0"/>
+              <a:t>Freedoom</a:t>
+            </a:r>
+            <a:r>
+              <a:rPr lang="en-US" dirty="0" smtClean="0"/>
+              <a:t> </a:t>
+            </a:r>
+            <a:endParaRPr lang="en-US" dirty="0"/>
+          </a:p>
+        </p:txBody>
+      </p:sp>
+      <p:sp>
+        <p:nvSpPr>
+          <p:cNvPr id="3" name="Content Placeholder 2"/>
+          <p:cNvSpPr>
+            <a:spLocks noGrp="1"/>
+          </p:cNvSpPr>
+          <p:nvPr>
+            <p:ph idx="1"/>
+          </p:nvPr>
+        </p:nvSpPr>
+        <p:spPr/>
+        <p:txBody>
+          <a:bodyPr>
+            <a:normAutofit/>
+          </a:bodyPr>
+          <a:lstStyle/>
+          <a:p>
+            <a:r>
+              <a:rPr lang="en-US" dirty="0" smtClean="0"/>
+              <a:t>Any IDE</a:t>
+            </a:r>
+          </a:p>
+          <a:p>
+            <a:pPr lvl="1"/>
+            <a:r>
+              <a:rPr lang="en-US" dirty="0" smtClean="0"/>
+              <a:t>No additional plugins required</a:t>
+            </a:r>
+          </a:p>
+          <a:p>
+            <a:pPr lvl="2"/>
+            <a:r>
+              <a:rPr lang="en-US" dirty="0" smtClean="0"/>
+              <a:t>Sites requires Eclipse and a plugin</a:t>
+            </a:r>
+            <a:endParaRPr lang="en-US" dirty="0" smtClean="0"/>
+          </a:p>
+          <a:p>
+            <a:r>
+              <a:rPr lang="en-US" dirty="0"/>
+              <a:t>Any version </a:t>
+            </a:r>
+            <a:r>
+              <a:rPr lang="en-US" dirty="0" smtClean="0"/>
+              <a:t>control</a:t>
+            </a:r>
+          </a:p>
+          <a:p>
+            <a:pPr lvl="1"/>
+            <a:r>
+              <a:rPr lang="en-US" dirty="0" smtClean="0"/>
+              <a:t>No restrictions on VC</a:t>
+            </a:r>
+          </a:p>
+          <a:p>
+            <a:pPr lvl="2"/>
+            <a:r>
+              <a:rPr lang="en-US" dirty="0" smtClean="0"/>
+              <a:t>Sites require his Revision Tracking</a:t>
+            </a:r>
+            <a:endParaRPr lang="en-US" dirty="0" smtClean="0"/>
+          </a:p>
+          <a:p>
+            <a:pPr marL="274320" lvl="1" indent="0">
+              <a:buNone/>
+            </a:pPr>
+            <a:endParaRPr lang="en-US" dirty="0" smtClean="0"/>
+          </a:p>
+          <a:p>
+            <a:pPr marL="0" indent="0">
+              <a:buNone/>
+            </a:pPr>
+            <a:endParaRPr lang="en-US" dirty="0"/>
+          </a:p>
+        </p:txBody>
+      </p:sp>
+    </p:spTree>
+    <p:extLst>
+      <p:ext uri="{BB962C8B-B14F-4D97-AF65-F5344CB8AC3E}">
+        <p14:creationId xmlns:p14="http://schemas.microsoft.com/office/powerpoint/2010/main" val="4216205668"/>
+      </p:ext>
+    </p:extLst>
+  </p:cSld>
+  <p:clrMapOvr>
+    <a:masterClrMapping/>
+  </p:clrMapOvr>
 </p:sld>
 </file>
 
@@ -7337,4 +9181,324 @@
   <a:objectDefaults/>
   <a:extraClrSchemeLst/>
 </a:theme>
+</file>
+
+<file path=ppt/theme/theme3.xml><?xml version="1.0" encoding="utf-8"?>
+<a:theme xmlns:a="http://schemas.openxmlformats.org/drawingml/2006/main" name="Office Theme">
+  <a:themeElements>
+    <a:clrScheme name="Office">
+      <a:dk1>
+        <a:sysClr val="windowText" lastClr="000000"/>
+      </a:dk1>
+      <a:lt1>
+        <a:sysClr val="window" lastClr="FFFFFF"/>
+      </a:lt1>
+      <a:dk2>
+        <a:srgbClr val="1F497D"/>
+      </a:dk2>
+      <a:lt2>
+        <a:srgbClr val="EEECE1"/>
+      </a:lt2>
+      <a:accent1>
+        <a:srgbClr val="4F81BD"/>
+      </a:accent1>
+      <a:accent2>
+        <a:srgbClr val="C0504D"/>
+      </a:accent2>
+      <a:accent3>
+        <a:srgbClr val="9BBB59"/>
+      </a:accent3>
+      <a:accent4>
+        <a:srgbClr val="8064A2"/>
+      </a:accent4>
+      <a:accent5>
+        <a:srgbClr val="4BACC6"/>
+      </a:accent5>
+      <a:accent6>
+        <a:srgbClr val="F79646"/>
+      </a:accent6>
+      <a:hlink>
+        <a:srgbClr val="0000FF"/>
+      </a:hlink>
+      <a:folHlink>
+        <a:srgbClr val="800080"/>
+      </a:folHlink>
+    </a:clrScheme>
+    <a:fontScheme name="Office">
+      <a:majorFont>
+        <a:latin typeface="Calibri"/>
+        <a:ea typeface=""/>
+        <a:cs typeface=""/>
+        <a:font script="Jpan" typeface="ＭＳ Ｐゴシック"/>
+        <a:font script="Hang" typeface="맑은 고딕"/>
+        <a:font script="Hans" typeface="宋体"/>
+        <a:font script="Hant" typeface="新細明體"/>
+        <a:font script="Arab" typeface="Times New Roman"/>
+        <a:font script="Hebr" typeface="Times New Roman"/>
+        <a:font script="Thai" typeface="Angsana New"/>
+        <a:font script="Ethi" typeface="Nyala"/>
+        <a:font script="Beng" typeface="Vrinda"/>
+        <a:font script="Gujr" typeface="Shruti"/>
+        <a:font script="Khmr" typeface="MoolBoran"/>
+        <a:font script="Knda" typeface="Tunga"/>
+        <a:font script="Guru" typeface="Raavi"/>
+        <a:font script="Cans" typeface="Euphemia"/>
+        <a:font script="Cher" typeface="Plantagenet Cherokee"/>
+        <a:font script="Yiii" typeface="Microsoft Yi Baiti"/>
+        <a:font script="Tibt" typeface="Microsoft Himalaya"/>
+        <a:font script="Thaa" typeface="MV Boli"/>
+        <a:font script="Deva" typeface="Mangal"/>
+        <a:font script="Telu" typeface="Gautami"/>
+        <a:font script="Taml" typeface="Latha"/>
+        <a:font script="Syrc" typeface="Estrangelo Edessa"/>
+        <a:font script="Orya" typeface="Kalinga"/>
+        <a:font script="Mlym" typeface="Kartika"/>
+        <a:font script="Laoo" typeface="DokChampa"/>
+        <a:font script="Sinh" typeface="Iskoola Pota"/>
+        <a:font script="Mong" typeface="Mongolian Baiti"/>
+        <a:font script="Viet" typeface="Times New Roman"/>
+        <a:font script="Uigh" typeface="Microsoft Uighur"/>
+        <a:font script="Geor" typeface="Sylfaen"/>
+      </a:majorFont>
+      <a:minorFont>
+        <a:latin typeface="Calibri"/>
+        <a:ea typeface=""/>
+        <a:cs typeface=""/>
+        <a:font script="Jpan" typeface="ＭＳ Ｐゴシック"/>
+        <a:font script="Hang" typeface="맑은 고딕"/>
+        <a:font script="Hans" typeface="宋体"/>
+        <a:font script="Hant" typeface="新細明體"/>
+        <a:font script="Arab" typeface="Arial"/>
+        <a:font script="Hebr" typeface="Arial"/>
+        <a:font script="Thai" typeface="Cordia New"/>
+        <a:font script="Ethi" typeface="Nyala"/>
+        <a:font script="Beng" typeface="Vrinda"/>
+        <a:font script="Gujr" typeface="Shruti"/>
+        <a:font script="Khmr" typeface="DaunPenh"/>
+        <a:font script="Knda" typeface="Tunga"/>
+        <a:font script="Guru" typeface="Raavi"/>
+        <a:font script="Cans" typeface="Euphemia"/>
+        <a:font script="Cher" typeface="Plantagenet Cherokee"/>
+        <a:font script="Yiii" typeface="Microsoft Yi Baiti"/>
+        <a:font script="Tibt" typeface="Microsoft Himalaya"/>
+        <a:font script="Thaa" typeface="MV Boli"/>
+        <a:font script="Deva" typeface="Mangal"/>
+        <a:font script="Telu" typeface="Gautami"/>
+        <a:font script="Taml" typeface="Latha"/>
+        <a:font script="Syrc" typeface="Estrangelo Edessa"/>
+        <a:font script="Orya" typeface="Kalinga"/>
+        <a:font script="Mlym" typeface="Kartika"/>
+        <a:font script="Laoo" typeface="DokChampa"/>
+        <a:font script="Sinh" typeface="Iskoola Pota"/>
+        <a:font script="Mong" typeface="Mongolian Baiti"/>
+        <a:font script="Viet" typeface="Arial"/>
+        <a:font script="Uigh" typeface="Microsoft Uighur"/>
+        <a:font script="Geor" typeface="Sylfaen"/>
+      </a:minorFont>
+    </a:fontScheme>
+    <a:fmtScheme name="Office">
+      <a:fillStyleLst>
+        <a:solidFill>
+          <a:schemeClr val="phClr"/>
+        </a:solidFill>
+        <a:gradFill rotWithShape="1">
+          <a:gsLst>
+            <a:gs pos="0">
+              <a:schemeClr val="phClr">
+                <a:tint val="50000"/>
+                <a:satMod val="300000"/>
+              </a:schemeClr>
+            </a:gs>
+            <a:gs pos="35000">
+              <a:schemeClr val="phClr">
+                <a:tint val="37000"/>
+                <a:satMod val="300000"/>
+              </a:schemeClr>
+            </a:gs>
+            <a:gs pos="100000">
+              <a:schemeClr val="phClr">
+                <a:tint val="15000"/>
+                <a:satMod val="350000"/>
+              </a:schemeClr>
+            </a:gs>
+          </a:gsLst>
+          <a:lin ang="16200000" scaled="1"/>
+        </a:gradFill>
+        <a:gradFill rotWithShape="1">
+          <a:gsLst>
+            <a:gs pos="0">
+              <a:schemeClr val="phClr">
+                <a:tint val="100000"/>
+                <a:shade val="100000"/>
+                <a:satMod val="130000"/>
+              </a:schemeClr>
+            </a:gs>
+            <a:gs pos="100000">
+              <a:schemeClr val="phClr">
+                <a:tint val="50000"/>
+                <a:shade val="100000"/>
+                <a:satMod val="350000"/>
+              </a:schemeClr>
+            </a:gs>
+          </a:gsLst>
+          <a:lin ang="16200000" scaled="0"/>
+        </a:gradFill>
+      </a:fillStyleLst>
+      <a:lnStyleLst>
+        <a:ln w="9525" cap="flat" cmpd="sng" algn="ctr">
+          <a:solidFill>
+            <a:schemeClr val="phClr">
+              <a:shade val="95000"/>
+              <a:satMod val="105000"/>
+            </a:schemeClr>
+          </a:solidFill>
+          <a:prstDash val="solid"/>
+        </a:ln>
+        <a:ln w="25400" cap="flat" cmpd="sng" algn="ctr">
+          <a:solidFill>
+            <a:schemeClr val="phClr"/>
+          </a:solidFill>
+          <a:prstDash val="solid"/>
+        </a:ln>
+        <a:ln w="38100" cap="flat" cmpd="sng" algn="ctr">
+          <a:solidFill>
+            <a:schemeClr val="phClr"/>
+          </a:solidFill>
+          <a:prstDash val="solid"/>
+        </a:ln>
+      </a:lnStyleLst>
+      <a:effectStyleLst>
+        <a:effectStyle>
+          <a:effectLst>
+            <a:outerShdw blurRad="40000" dist="20000" dir="5400000" rotWithShape="0">
+              <a:srgbClr val="000000">
+                <a:alpha val="38000"/>
+              </a:srgbClr>
+            </a:outerShdw>
+          </a:effectLst>
+        </a:effectStyle>
+        <a:effectStyle>
+          <a:effectLst>
+            <a:outerShdw blurRad="40000" dist="23000" dir="5400000" rotWithShape="0">
+              <a:srgbClr val="000000">
+                <a:alpha val="35000"/>
+              </a:srgbClr>
+            </a:outerShdw>
+          </a:effectLst>
+        </a:effectStyle>
+        <a:effectStyle>
+          <a:effectLst>
+            <a:outerShdw blurRad="40000" dist="23000" dir="5400000" rotWithShape="0">
+              <a:srgbClr val="000000">
+                <a:alpha val="35000"/>
+              </a:srgbClr>
+            </a:outerShdw>
+          </a:effectLst>
+          <a:scene3d>
+            <a:camera prst="orthographicFront">
+              <a:rot lat="0" lon="0" rev="0"/>
+            </a:camera>
+            <a:lightRig rig="threePt" dir="t">
+              <a:rot lat="0" lon="0" rev="1200000"/>
+            </a:lightRig>
+          </a:scene3d>
+          <a:sp3d>
+            <a:bevelT w="63500" h="25400"/>
+          </a:sp3d>
+        </a:effectStyle>
+      </a:effectStyleLst>
+      <a:bgFillStyleLst>
+        <a:solidFill>
+          <a:schemeClr val="phClr"/>
+        </a:solidFill>
+        <a:gradFill rotWithShape="1">
+          <a:gsLst>
+            <a:gs pos="0">
+              <a:schemeClr val="phClr">
+                <a:tint val="40000"/>
+                <a:satMod val="350000"/>
+              </a:schemeClr>
+            </a:gs>
+            <a:gs pos="40000">
+              <a:schemeClr val="phClr">
+                <a:tint val="45000"/>
+                <a:shade val="99000"/>
+                <a:satMod val="350000"/>
+              </a:schemeClr>
+            </a:gs>
+            <a:gs pos="100000">
+              <a:schemeClr val="phClr">
+                <a:shade val="20000"/>
+                <a:satMod val="255000"/>
+              </a:schemeClr>
+            </a:gs>
+          </a:gsLst>
+          <a:path path="circle">
+            <a:fillToRect l="50000" t="-80000" r="50000" b="180000"/>
+          </a:path>
+        </a:gradFill>
+        <a:gradFill rotWithShape="1">
+          <a:gsLst>
+            <a:gs pos="0">
+              <a:schemeClr val="phClr">
+                <a:tint val="80000"/>
+                <a:satMod val="300000"/>
+              </a:schemeClr>
+            </a:gs>
+            <a:gs pos="100000">
+              <a:schemeClr val="phClr">
+                <a:shade val="30000"/>
+                <a:satMod val="200000"/>
+              </a:schemeClr>
+            </a:gs>
+          </a:gsLst>
+          <a:path path="circle">
+            <a:fillToRect l="50000" t="50000" r="50000" b="50000"/>
+          </a:path>
+        </a:gradFill>
+      </a:bgFillStyleLst>
+    </a:fmtScheme>
+  </a:themeElements>
+  <a:objectDefaults>
+    <a:spDef>
+      <a:spPr/>
+      <a:bodyPr/>
+      <a:lstStyle/>
+      <a:style>
+        <a:lnRef idx="1">
+          <a:schemeClr val="accent1"/>
+        </a:lnRef>
+        <a:fillRef idx="3">
+          <a:schemeClr val="accent1"/>
+        </a:fillRef>
+        <a:effectRef idx="2">
+          <a:schemeClr val="accent1"/>
+        </a:effectRef>
+        <a:fontRef idx="minor">
+          <a:schemeClr val="lt1"/>
+        </a:fontRef>
+      </a:style>
+    </a:spDef>
+    <a:lnDef>
+      <a:spPr/>
+      <a:bodyPr/>
+      <a:lstStyle/>
+      <a:style>
+        <a:lnRef idx="2">
+          <a:schemeClr val="accent1"/>
+        </a:lnRef>
+        <a:fillRef idx="0">
+          <a:schemeClr val="accent1"/>
+        </a:fillRef>
+        <a:effectRef idx="1">
+          <a:schemeClr val="accent1"/>
+        </a:effectRef>
+        <a:fontRef idx="minor">
+          <a:schemeClr val="tx1"/>
+        </a:fontRef>
+      </a:style>
+    </a:lnDef>
+  </a:objectDefaults>
+  <a:extraClrSchemeLst/>
+</a:theme>
 </file>
</xml_diff>